<commit_message>
final strucuture of presentation done
</commit_message>
<xml_diff>
--- a/figures/custom_figues.pptx
+++ b/figures/custom_figues.pptx
@@ -7,6 +7,7 @@
   <p:sldIdLst>
     <p:sldId id="256" r:id="rId2"/>
     <p:sldId id="257" r:id="rId3"/>
+    <p:sldId id="258" r:id="rId4"/>
   </p:sldIdLst>
   <p:sldSz cx="12192000" cy="6858000"/>
   <p:notesSz cx="6858000" cy="9144000"/>
@@ -105,6 +106,11 @@
       </a:defRPr>
     </a:lvl9pPr>
   </p:defaultTextStyle>
+  <p:extLst>
+    <p:ext uri="{EFAFB233-063F-42B5-8137-9DF3F51BA10A}">
+      <p15:sldGuideLst xmlns:p15="http://schemas.microsoft.com/office/powerpoint/2012/main"/>
+    </p:ext>
+  </p:extLst>
 </p:presentation>
 </file>
 
@@ -2920,7 +2926,7 @@
           <a:p>
             <a:fld id="{D5F60856-2EF1-5F4B-9954-DAACB240462E}" type="datetimeFigureOut">
               <a:rPr lang="de-DE" smtClean="0"/>
-              <a:t>07.01.25</a:t>
+              <a:t>11.01.25</a:t>
             </a:fld>
             <a:endParaRPr lang="de-DE"/>
           </a:p>
@@ -3118,7 +3124,7 @@
           <a:p>
             <a:fld id="{D5F60856-2EF1-5F4B-9954-DAACB240462E}" type="datetimeFigureOut">
               <a:rPr lang="de-DE" smtClean="0"/>
-              <a:t>07.01.25</a:t>
+              <a:t>11.01.25</a:t>
             </a:fld>
             <a:endParaRPr lang="de-DE"/>
           </a:p>
@@ -3326,7 +3332,7 @@
           <a:p>
             <a:fld id="{D5F60856-2EF1-5F4B-9954-DAACB240462E}" type="datetimeFigureOut">
               <a:rPr lang="de-DE" smtClean="0"/>
-              <a:t>07.01.25</a:t>
+              <a:t>11.01.25</a:t>
             </a:fld>
             <a:endParaRPr lang="de-DE"/>
           </a:p>
@@ -3524,7 +3530,7 @@
           <a:p>
             <a:fld id="{D5F60856-2EF1-5F4B-9954-DAACB240462E}" type="datetimeFigureOut">
               <a:rPr lang="de-DE" smtClean="0"/>
-              <a:t>07.01.25</a:t>
+              <a:t>11.01.25</a:t>
             </a:fld>
             <a:endParaRPr lang="de-DE"/>
           </a:p>
@@ -3799,7 +3805,7 @@
           <a:p>
             <a:fld id="{D5F60856-2EF1-5F4B-9954-DAACB240462E}" type="datetimeFigureOut">
               <a:rPr lang="de-DE" smtClean="0"/>
-              <a:t>07.01.25</a:t>
+              <a:t>11.01.25</a:t>
             </a:fld>
             <a:endParaRPr lang="de-DE"/>
           </a:p>
@@ -4064,7 +4070,7 @@
           <a:p>
             <a:fld id="{D5F60856-2EF1-5F4B-9954-DAACB240462E}" type="datetimeFigureOut">
               <a:rPr lang="de-DE" smtClean="0"/>
-              <a:t>07.01.25</a:t>
+              <a:t>11.01.25</a:t>
             </a:fld>
             <a:endParaRPr lang="de-DE"/>
           </a:p>
@@ -4476,7 +4482,7 @@
           <a:p>
             <a:fld id="{D5F60856-2EF1-5F4B-9954-DAACB240462E}" type="datetimeFigureOut">
               <a:rPr lang="de-DE" smtClean="0"/>
-              <a:t>07.01.25</a:t>
+              <a:t>11.01.25</a:t>
             </a:fld>
             <a:endParaRPr lang="de-DE"/>
           </a:p>
@@ -4617,7 +4623,7 @@
           <a:p>
             <a:fld id="{D5F60856-2EF1-5F4B-9954-DAACB240462E}" type="datetimeFigureOut">
               <a:rPr lang="de-DE" smtClean="0"/>
-              <a:t>07.01.25</a:t>
+              <a:t>11.01.25</a:t>
             </a:fld>
             <a:endParaRPr lang="de-DE"/>
           </a:p>
@@ -4730,7 +4736,7 @@
           <a:p>
             <a:fld id="{D5F60856-2EF1-5F4B-9954-DAACB240462E}" type="datetimeFigureOut">
               <a:rPr lang="de-DE" smtClean="0"/>
-              <a:t>07.01.25</a:t>
+              <a:t>11.01.25</a:t>
             </a:fld>
             <a:endParaRPr lang="de-DE"/>
           </a:p>
@@ -5041,7 +5047,7 @@
           <a:p>
             <a:fld id="{D5F60856-2EF1-5F4B-9954-DAACB240462E}" type="datetimeFigureOut">
               <a:rPr lang="de-DE" smtClean="0"/>
-              <a:t>07.01.25</a:t>
+              <a:t>11.01.25</a:t>
             </a:fld>
             <a:endParaRPr lang="de-DE"/>
           </a:p>
@@ -5329,7 +5335,7 @@
           <a:p>
             <a:fld id="{D5F60856-2EF1-5F4B-9954-DAACB240462E}" type="datetimeFigureOut">
               <a:rPr lang="de-DE" smtClean="0"/>
-              <a:t>07.01.25</a:t>
+              <a:t>11.01.25</a:t>
             </a:fld>
             <a:endParaRPr lang="de-DE"/>
           </a:p>
@@ -5570,7 +5576,7 @@
           <a:p>
             <a:fld id="{D5F60856-2EF1-5F4B-9954-DAACB240462E}" type="datetimeFigureOut">
               <a:rPr lang="de-DE" smtClean="0"/>
-              <a:t>07.01.25</a:t>
+              <a:t>11.01.25</a:t>
             </a:fld>
             <a:endParaRPr lang="de-DE"/>
           </a:p>
@@ -6246,6 +6252,440 @@
     <p:extLst>
       <p:ext uri="{BB962C8B-B14F-4D97-AF65-F5344CB8AC3E}">
         <p14:creationId xmlns:p14="http://schemas.microsoft.com/office/powerpoint/2010/main" val="2574724169"/>
+      </p:ext>
+    </p:extLst>
+  </p:cSld>
+  <p:clrMapOvr>
+    <a:masterClrMapping/>
+  </p:clrMapOvr>
+</p:sld>
+</file>
+
+<file path=ppt/slides/slide3.xml><?xml version="1.0" encoding="utf-8"?>
+<p:sld xmlns:a="http://schemas.openxmlformats.org/drawingml/2006/main" xmlns:r="http://schemas.openxmlformats.org/officeDocument/2006/relationships" xmlns:p="http://schemas.openxmlformats.org/presentationml/2006/main">
+  <p:cSld>
+    <p:bg>
+      <p:bgPr>
+        <a:solidFill>
+          <a:schemeClr val="bg1"/>
+        </a:solidFill>
+        <a:effectLst/>
+      </p:bgPr>
+    </p:bg>
+    <p:spTree>
+      <p:nvGrpSpPr>
+        <p:cNvPr id="1" name=""/>
+        <p:cNvGrpSpPr/>
+        <p:nvPr/>
+      </p:nvGrpSpPr>
+      <p:grpSpPr>
+        <a:xfrm>
+          <a:off x="0" y="0"/>
+          <a:ext cx="0" cy="0"/>
+          <a:chOff x="0" y="0"/>
+          <a:chExt cx="0" cy="0"/>
+        </a:xfrm>
+      </p:grpSpPr>
+      <p:sp useBgFill="1">
+        <p:nvSpPr>
+          <p:cNvPr id="16" name="Rectangle 15">
+            <a:extLst>
+              <a:ext uri="{FF2B5EF4-FFF2-40B4-BE49-F238E27FC236}">
+                <a16:creationId xmlns:a16="http://schemas.microsoft.com/office/drawing/2014/main" id="{56604AF4-AEF7-4020-93AD-C74808D17E3E}"/>
+              </a:ext>
+              <a:ext uri="{C183D7F6-B498-43B3-948B-1728B52AA6E4}">
+                <adec:decorative xmlns:adec="http://schemas.microsoft.com/office/drawing/2017/decorative" val="1"/>
+              </a:ext>
+            </a:extLst>
+          </p:cNvPr>
+          <p:cNvSpPr>
+            <a:spLocks noGrp="1" noRot="1" noChangeAspect="1" noMove="1" noResize="1" noEditPoints="1" noAdjustHandles="1" noChangeArrowheads="1" noChangeShapeType="1" noTextEdit="1"/>
+          </p:cNvSpPr>
+          <p:nvPr>
+            <p:extLst>
+              <p:ext uri="{386F3935-93C4-4BCD-93E2-E3B085C9AB24}">
+                <p16:designElem xmlns:p16="http://schemas.microsoft.com/office/powerpoint/2015/main" val="1"/>
+              </p:ext>
+            </p:extLst>
+          </p:nvPr>
+        </p:nvSpPr>
+        <p:spPr>
+          <a:xfrm>
+            <a:off x="0" y="0"/>
+            <a:ext cx="12192000" cy="6858000"/>
+          </a:xfrm>
+          <a:prstGeom prst="rect">
+            <a:avLst/>
+          </a:prstGeom>
+          <a:ln w="12700" cap="flat" cmpd="sng" algn="ctr">
+            <a:noFill/>
+            <a:prstDash val="solid"/>
+            <a:miter lim="800000"/>
+          </a:ln>
+          <a:effectLst/>
+          <a:extLst>
+            <a:ext uri="{91240B29-F687-4F45-9708-019B960494DF}">
+              <a14:hiddenLine xmlns:a14="http://schemas.microsoft.com/office/drawing/2010/main" w="12700" cap="flat" cmpd="sng" algn="ctr">
+                <a:solidFill>
+                  <a:schemeClr val="accent1">
+                    <a:shade val="50000"/>
+                  </a:schemeClr>
+                </a:solidFill>
+                <a:prstDash val="solid"/>
+                <a:miter lim="800000"/>
+              </a14:hiddenLine>
+            </a:ext>
+          </a:extLst>
+        </p:spPr>
+        <p:style>
+          <a:lnRef idx="2">
+            <a:schemeClr val="accent1">
+              <a:shade val="50000"/>
+            </a:schemeClr>
+          </a:lnRef>
+          <a:fillRef idx="1">
+            <a:schemeClr val="accent1"/>
+          </a:fillRef>
+          <a:effectRef idx="0">
+            <a:schemeClr val="accent1"/>
+          </a:effectRef>
+          <a:fontRef idx="minor">
+            <a:schemeClr val="lt1"/>
+          </a:fontRef>
+        </p:style>
+        <p:txBody>
+          <a:bodyPr rtlCol="0" anchor="ctr"/>
+          <a:lstStyle/>
+          <a:p>
+            <a:pPr algn="ctr"/>
+            <a:endParaRPr lang="en-US"/>
+          </a:p>
+        </p:txBody>
+      </p:sp>
+      <p:sp>
+        <p:nvSpPr>
+          <p:cNvPr id="18" name="Rectangle 17">
+            <a:extLst>
+              <a:ext uri="{FF2B5EF4-FFF2-40B4-BE49-F238E27FC236}">
+                <a16:creationId xmlns:a16="http://schemas.microsoft.com/office/drawing/2014/main" id="{EDB65AB2-AC18-4139-B8BE-52452A256449}"/>
+              </a:ext>
+              <a:ext uri="{C183D7F6-B498-43B3-948B-1728B52AA6E4}">
+                <adec:decorative xmlns:adec="http://schemas.microsoft.com/office/drawing/2017/decorative" val="1"/>
+              </a:ext>
+            </a:extLst>
+          </p:cNvPr>
+          <p:cNvSpPr>
+            <a:spLocks noGrp="1" noRot="1" noChangeAspect="1" noMove="1" noResize="1" noEditPoints="1" noAdjustHandles="1" noChangeArrowheads="1" noChangeShapeType="1" noTextEdit="1"/>
+          </p:cNvSpPr>
+          <p:nvPr>
+            <p:extLst>
+              <p:ext uri="{386F3935-93C4-4BCD-93E2-E3B085C9AB24}">
+                <p16:designElem xmlns:p16="http://schemas.microsoft.com/office/powerpoint/2015/main" val="1"/>
+              </p:ext>
+            </p:extLst>
+          </p:nvPr>
+        </p:nvSpPr>
+        <p:spPr>
+          <a:xfrm>
+            <a:off x="-2" y="1"/>
+            <a:ext cx="12192001" cy="6858000"/>
+          </a:xfrm>
+          <a:prstGeom prst="rect">
+            <a:avLst/>
+          </a:prstGeom>
+          <a:solidFill>
+            <a:schemeClr val="accent2">
+              <a:lumMod val="20000"/>
+              <a:lumOff val="80000"/>
+            </a:schemeClr>
+          </a:solidFill>
+          <a:ln>
+            <a:noFill/>
+          </a:ln>
+        </p:spPr>
+        <p:style>
+          <a:lnRef idx="2">
+            <a:schemeClr val="accent1">
+              <a:shade val="50000"/>
+            </a:schemeClr>
+          </a:lnRef>
+          <a:fillRef idx="1">
+            <a:schemeClr val="accent1"/>
+          </a:fillRef>
+          <a:effectRef idx="0">
+            <a:schemeClr val="accent1"/>
+          </a:effectRef>
+          <a:fontRef idx="minor">
+            <a:schemeClr val="lt1"/>
+          </a:fontRef>
+        </p:style>
+        <p:txBody>
+          <a:bodyPr rtlCol="0" anchor="ctr"/>
+          <a:lstStyle/>
+          <a:p>
+            <a:pPr algn="ctr"/>
+            <a:endParaRPr lang="en-US"/>
+          </a:p>
+        </p:txBody>
+      </p:sp>
+      <p:sp>
+        <p:nvSpPr>
+          <p:cNvPr id="20" name="Rectangle 19">
+            <a:extLst>
+              <a:ext uri="{FF2B5EF4-FFF2-40B4-BE49-F238E27FC236}">
+                <a16:creationId xmlns:a16="http://schemas.microsoft.com/office/drawing/2014/main" id="{B89A5304-EF26-47F3-9CB7-ED121FC744E7}"/>
+              </a:ext>
+              <a:ext uri="{C183D7F6-B498-43B3-948B-1728B52AA6E4}">
+                <adec:decorative xmlns:adec="http://schemas.microsoft.com/office/drawing/2017/decorative" val="1"/>
+              </a:ext>
+            </a:extLst>
+          </p:cNvPr>
+          <p:cNvSpPr>
+            <a:spLocks noGrp="1" noRot="1" noChangeAspect="1" noMove="1" noResize="1" noEditPoints="1" noAdjustHandles="1" noChangeArrowheads="1" noChangeShapeType="1" noTextEdit="1"/>
+          </p:cNvSpPr>
+          <p:nvPr>
+            <p:extLst>
+              <p:ext uri="{386F3935-93C4-4BCD-93E2-E3B085C9AB24}">
+                <p16:designElem xmlns:p16="http://schemas.microsoft.com/office/powerpoint/2015/main" val="1"/>
+              </p:ext>
+            </p:extLst>
+          </p:nvPr>
+        </p:nvSpPr>
+        <p:spPr>
+          <a:xfrm>
+            <a:off x="685798" y="685799"/>
+            <a:ext cx="10820400" cy="5486401"/>
+          </a:xfrm>
+          <a:prstGeom prst="rect">
+            <a:avLst/>
+          </a:prstGeom>
+          <a:solidFill>
+            <a:schemeClr val="bg1"/>
+          </a:solidFill>
+          <a:ln>
+            <a:noFill/>
+          </a:ln>
+        </p:spPr>
+        <p:style>
+          <a:lnRef idx="2">
+            <a:schemeClr val="accent1">
+              <a:shade val="50000"/>
+            </a:schemeClr>
+          </a:lnRef>
+          <a:fillRef idx="1">
+            <a:schemeClr val="accent1"/>
+          </a:fillRef>
+          <a:effectRef idx="0">
+            <a:schemeClr val="accent1"/>
+          </a:effectRef>
+          <a:fontRef idx="minor">
+            <a:schemeClr val="lt1"/>
+          </a:fontRef>
+        </p:style>
+        <p:txBody>
+          <a:bodyPr rtlCol="0" anchor="ctr"/>
+          <a:lstStyle/>
+          <a:p>
+            <a:pPr algn="ctr"/>
+            <a:endParaRPr lang="en-US"/>
+          </a:p>
+        </p:txBody>
+      </p:sp>
+      <p:sp>
+        <p:nvSpPr>
+          <p:cNvPr id="2" name="Titel 1">
+            <a:extLst>
+              <a:ext uri="{FF2B5EF4-FFF2-40B4-BE49-F238E27FC236}">
+                <a16:creationId xmlns:a16="http://schemas.microsoft.com/office/drawing/2014/main" id="{3F7099C3-9DDA-4A6C-0456-F77300A4E19C}"/>
+              </a:ext>
+            </a:extLst>
+          </p:cNvPr>
+          <p:cNvSpPr>
+            <a:spLocks noGrp="1"/>
+          </p:cNvSpPr>
+          <p:nvPr>
+            <p:ph type="title"/>
+          </p:nvPr>
+        </p:nvSpPr>
+        <p:spPr>
+          <a:xfrm>
+            <a:off x="1587794" y="1136478"/>
+            <a:ext cx="9016409" cy="1051885"/>
+          </a:xfrm>
+        </p:spPr>
+        <p:txBody>
+          <a:bodyPr anchor="ctr">
+            <a:normAutofit/>
+          </a:bodyPr>
+          <a:lstStyle/>
+          <a:p>
+            <a:pPr algn="ctr"/>
+            <a:r>
+              <a:rPr lang="de-DE" sz="3200">
+                <a:solidFill>
+                  <a:schemeClr val="tx1">
+                    <a:lumMod val="65000"/>
+                    <a:lumOff val="35000"/>
+                  </a:schemeClr>
+                </a:solidFill>
+              </a:rPr>
+              <a:t>Gruppen vs Individual</a:t>
+            </a:r>
+          </a:p>
+        </p:txBody>
+      </p:sp>
+      <p:pic>
+        <p:nvPicPr>
+          <p:cNvPr id="7" name="Grafik 6" descr="Mann mit einfarbiger Füllung">
+            <a:extLst>
+              <a:ext uri="{FF2B5EF4-FFF2-40B4-BE49-F238E27FC236}">
+                <a16:creationId xmlns:a16="http://schemas.microsoft.com/office/drawing/2014/main" id="{D1FE2C8B-FF9E-9034-8105-1B3F157AF3E8}"/>
+              </a:ext>
+            </a:extLst>
+          </p:cNvPr>
+          <p:cNvPicPr>
+            <a:picLocks noChangeAspect="1"/>
+          </p:cNvPicPr>
+          <p:nvPr/>
+        </p:nvPicPr>
+        <p:blipFill>
+          <a:blip r:embed="rId2">
+            <a:extLst>
+              <a:ext uri="{96DAC541-7B7A-43D3-8B79-37D633B846F1}">
+                <asvg:svgBlip xmlns:asvg="http://schemas.microsoft.com/office/drawing/2016/SVG/main" r:embed="rId3"/>
+              </a:ext>
+            </a:extLst>
+          </a:blip>
+          <a:stretch>
+            <a:fillRect/>
+          </a:stretch>
+        </p:blipFill>
+        <p:spPr>
+          <a:xfrm>
+            <a:off x="2345482" y="2391333"/>
+            <a:ext cx="1897674" cy="1897674"/>
+          </a:xfrm>
+          <a:prstGeom prst="rect">
+            <a:avLst/>
+          </a:prstGeom>
+        </p:spPr>
+      </p:pic>
+      <p:pic>
+        <p:nvPicPr>
+          <p:cNvPr id="9" name="Grafik 8" descr="Waage der Justitia Silhouette">
+            <a:extLst>
+              <a:ext uri="{FF2B5EF4-FFF2-40B4-BE49-F238E27FC236}">
+                <a16:creationId xmlns:a16="http://schemas.microsoft.com/office/drawing/2014/main" id="{67974117-7E2A-7A04-84C8-84008D546669}"/>
+              </a:ext>
+            </a:extLst>
+          </p:cNvPr>
+          <p:cNvPicPr>
+            <a:picLocks noChangeAspect="1"/>
+          </p:cNvPicPr>
+          <p:nvPr/>
+        </p:nvPicPr>
+        <p:blipFill>
+          <a:blip r:embed="rId4">
+            <a:extLst>
+              <a:ext uri="{96DAC541-7B7A-43D3-8B79-37D633B846F1}">
+                <asvg:svgBlip xmlns:asvg="http://schemas.microsoft.com/office/drawing/2016/SVG/main" r:embed="rId5"/>
+              </a:ext>
+            </a:extLst>
+          </a:blip>
+          <a:stretch>
+            <a:fillRect/>
+          </a:stretch>
+        </p:blipFill>
+        <p:spPr>
+          <a:xfrm>
+            <a:off x="5147161" y="2372516"/>
+            <a:ext cx="1897675" cy="1897675"/>
+          </a:xfrm>
+          <a:prstGeom prst="rect">
+            <a:avLst/>
+          </a:prstGeom>
+        </p:spPr>
+      </p:pic>
+      <p:pic>
+        <p:nvPicPr>
+          <p:cNvPr id="5" name="Inhaltsplatzhalter 4" descr="Gruppe von Männern mit einfarbiger Füllung">
+            <a:extLst>
+              <a:ext uri="{FF2B5EF4-FFF2-40B4-BE49-F238E27FC236}">
+                <a16:creationId xmlns:a16="http://schemas.microsoft.com/office/drawing/2014/main" id="{6E1D8C17-A653-B164-1C2C-CF19390FA3FE}"/>
+              </a:ext>
+            </a:extLst>
+          </p:cNvPr>
+          <p:cNvPicPr>
+            <a:picLocks noChangeAspect="1"/>
+          </p:cNvPicPr>
+          <p:nvPr/>
+        </p:nvPicPr>
+        <p:blipFill>
+          <a:blip r:embed="rId6">
+            <a:extLst>
+              <a:ext uri="{96DAC541-7B7A-43D3-8B79-37D633B846F1}">
+                <asvg:svgBlip xmlns:asvg="http://schemas.microsoft.com/office/drawing/2016/SVG/main" r:embed="rId7"/>
+              </a:ext>
+            </a:extLst>
+          </a:blip>
+          <a:stretch>
+            <a:fillRect/>
+          </a:stretch>
+        </p:blipFill>
+        <p:spPr>
+          <a:xfrm>
+            <a:off x="7931161" y="2391331"/>
+            <a:ext cx="1911768" cy="1911768"/>
+          </a:xfrm>
+          <a:prstGeom prst="rect">
+            <a:avLst/>
+          </a:prstGeom>
+        </p:spPr>
+      </p:pic>
+      <p:sp>
+        <p:nvSpPr>
+          <p:cNvPr id="13" name="Content Placeholder 12">
+            <a:extLst>
+              <a:ext uri="{FF2B5EF4-FFF2-40B4-BE49-F238E27FC236}">
+                <a16:creationId xmlns:a16="http://schemas.microsoft.com/office/drawing/2014/main" id="{10FC06EB-5E05-31A6-8258-2C67486CEC20}"/>
+              </a:ext>
+            </a:extLst>
+          </p:cNvPr>
+          <p:cNvSpPr>
+            <a:spLocks noGrp="1"/>
+          </p:cNvSpPr>
+          <p:nvPr>
+            <p:ph idx="1"/>
+          </p:nvPr>
+        </p:nvSpPr>
+        <p:spPr>
+          <a:xfrm>
+            <a:off x="1757914" y="4628363"/>
+            <a:ext cx="8676169" cy="980311"/>
+          </a:xfrm>
+        </p:spPr>
+        <p:txBody>
+          <a:bodyPr anchor="t">
+            <a:normAutofit/>
+          </a:bodyPr>
+          <a:lstStyle/>
+          <a:p>
+            <a:pPr algn="ctr"/>
+            <a:endParaRPr lang="en-US" sz="2000">
+              <a:solidFill>
+                <a:schemeClr val="tx1">
+                  <a:lumMod val="65000"/>
+                  <a:lumOff val="35000"/>
+                </a:schemeClr>
+              </a:solidFill>
+            </a:endParaRPr>
+          </a:p>
+        </p:txBody>
+      </p:sp>
+    </p:spTree>
+    <p:extLst>
+      <p:ext uri="{BB962C8B-B14F-4D97-AF65-F5344CB8AC3E}">
+        <p14:creationId xmlns:p14="http://schemas.microsoft.com/office/powerpoint/2010/main" val="520112351"/>
       </p:ext>
     </p:extLst>
   </p:cSld>

</xml_diff>

<commit_message>
fairness loop figure english
</commit_message>
<xml_diff>
--- a/figures/custom_figues.pptx
+++ b/figures/custom_figues.pptx
@@ -7,7 +7,8 @@
   <p:sldIdLst>
     <p:sldId id="256" r:id="rId2"/>
     <p:sldId id="257" r:id="rId3"/>
-    <p:sldId id="258" r:id="rId4"/>
+    <p:sldId id="259" r:id="rId4"/>
+    <p:sldId id="258" r:id="rId5"/>
   </p:sldIdLst>
   <p:sldSz cx="12192000" cy="6858000"/>
   <p:notesSz cx="6858000" cy="9144000"/>
@@ -861,6 +862,753 @@
 </dgm:colorsDef>
 </file>
 
+<file path=ppt/diagrams/colors2.xml><?xml version="1.0" encoding="utf-8"?>
+<dgm:colorsDef xmlns:dgm="http://schemas.openxmlformats.org/drawingml/2006/diagram" xmlns:a="http://schemas.openxmlformats.org/drawingml/2006/main" uniqueId="urn:microsoft.com/office/officeart/2005/8/colors/accent1_2">
+  <dgm:title val=""/>
+  <dgm:desc val=""/>
+  <dgm:catLst>
+    <dgm:cat type="accent1" pri="11200"/>
+  </dgm:catLst>
+  <dgm:styleLbl name="node0">
+    <dgm:fillClrLst meth="repeat">
+      <a:schemeClr val="accent1"/>
+    </dgm:fillClrLst>
+    <dgm:linClrLst meth="repeat">
+      <a:schemeClr val="lt1"/>
+    </dgm:linClrLst>
+    <dgm:effectClrLst/>
+    <dgm:txLinClrLst/>
+    <dgm:txFillClrLst/>
+    <dgm:txEffectClrLst/>
+  </dgm:styleLbl>
+  <dgm:styleLbl name="alignNode1">
+    <dgm:fillClrLst meth="repeat">
+      <a:schemeClr val="accent1"/>
+    </dgm:fillClrLst>
+    <dgm:linClrLst meth="repeat">
+      <a:schemeClr val="accent1"/>
+    </dgm:linClrLst>
+    <dgm:effectClrLst/>
+    <dgm:txLinClrLst/>
+    <dgm:txFillClrLst/>
+    <dgm:txEffectClrLst/>
+  </dgm:styleLbl>
+  <dgm:styleLbl name="node1">
+    <dgm:fillClrLst meth="repeat">
+      <a:schemeClr val="accent1"/>
+    </dgm:fillClrLst>
+    <dgm:linClrLst meth="repeat">
+      <a:schemeClr val="lt1"/>
+    </dgm:linClrLst>
+    <dgm:effectClrLst/>
+    <dgm:txLinClrLst/>
+    <dgm:txFillClrLst/>
+    <dgm:txEffectClrLst/>
+  </dgm:styleLbl>
+  <dgm:styleLbl name="lnNode1">
+    <dgm:fillClrLst meth="repeat">
+      <a:schemeClr val="accent1"/>
+    </dgm:fillClrLst>
+    <dgm:linClrLst meth="repeat">
+      <a:schemeClr val="lt1"/>
+    </dgm:linClrLst>
+    <dgm:effectClrLst/>
+    <dgm:txLinClrLst/>
+    <dgm:txFillClrLst/>
+    <dgm:txEffectClrLst/>
+  </dgm:styleLbl>
+  <dgm:styleLbl name="vennNode1">
+    <dgm:fillClrLst meth="repeat">
+      <a:schemeClr val="accent1">
+        <a:alpha val="50000"/>
+      </a:schemeClr>
+    </dgm:fillClrLst>
+    <dgm:linClrLst meth="repeat">
+      <a:schemeClr val="lt1"/>
+    </dgm:linClrLst>
+    <dgm:effectClrLst/>
+    <dgm:txLinClrLst/>
+    <dgm:txFillClrLst/>
+    <dgm:txEffectClrLst/>
+  </dgm:styleLbl>
+  <dgm:styleLbl name="node2">
+    <dgm:fillClrLst meth="repeat">
+      <a:schemeClr val="accent1"/>
+    </dgm:fillClrLst>
+    <dgm:linClrLst meth="repeat">
+      <a:schemeClr val="lt1"/>
+    </dgm:linClrLst>
+    <dgm:effectClrLst/>
+    <dgm:txLinClrLst/>
+    <dgm:txFillClrLst/>
+    <dgm:txEffectClrLst/>
+  </dgm:styleLbl>
+  <dgm:styleLbl name="node3">
+    <dgm:fillClrLst meth="repeat">
+      <a:schemeClr val="accent1"/>
+    </dgm:fillClrLst>
+    <dgm:linClrLst meth="repeat">
+      <a:schemeClr val="lt1"/>
+    </dgm:linClrLst>
+    <dgm:effectClrLst/>
+    <dgm:txLinClrLst/>
+    <dgm:txFillClrLst/>
+    <dgm:txEffectClrLst/>
+  </dgm:styleLbl>
+  <dgm:styleLbl name="node4">
+    <dgm:fillClrLst meth="repeat">
+      <a:schemeClr val="accent1"/>
+    </dgm:fillClrLst>
+    <dgm:linClrLst meth="repeat">
+      <a:schemeClr val="lt1"/>
+    </dgm:linClrLst>
+    <dgm:effectClrLst/>
+    <dgm:txLinClrLst/>
+    <dgm:txFillClrLst/>
+    <dgm:txEffectClrLst/>
+  </dgm:styleLbl>
+  <dgm:styleLbl name="fgImgPlace1">
+    <dgm:fillClrLst meth="repeat">
+      <a:schemeClr val="accent1">
+        <a:tint val="50000"/>
+      </a:schemeClr>
+    </dgm:fillClrLst>
+    <dgm:linClrLst meth="repeat">
+      <a:schemeClr val="lt1"/>
+    </dgm:linClrLst>
+    <dgm:effectClrLst/>
+    <dgm:txLinClrLst/>
+    <dgm:txFillClrLst meth="repeat">
+      <a:schemeClr val="lt1"/>
+    </dgm:txFillClrLst>
+    <dgm:txEffectClrLst/>
+  </dgm:styleLbl>
+  <dgm:styleLbl name="alignImgPlace1">
+    <dgm:fillClrLst meth="repeat">
+      <a:schemeClr val="accent1">
+        <a:tint val="50000"/>
+      </a:schemeClr>
+    </dgm:fillClrLst>
+    <dgm:linClrLst meth="repeat">
+      <a:schemeClr val="lt1"/>
+    </dgm:linClrLst>
+    <dgm:effectClrLst/>
+    <dgm:txLinClrLst/>
+    <dgm:txFillClrLst meth="repeat">
+      <a:schemeClr val="lt1"/>
+    </dgm:txFillClrLst>
+    <dgm:txEffectClrLst/>
+  </dgm:styleLbl>
+  <dgm:styleLbl name="bgImgPlace1">
+    <dgm:fillClrLst meth="repeat">
+      <a:schemeClr val="accent1">
+        <a:tint val="50000"/>
+      </a:schemeClr>
+    </dgm:fillClrLst>
+    <dgm:linClrLst meth="repeat">
+      <a:schemeClr val="lt1"/>
+    </dgm:linClrLst>
+    <dgm:effectClrLst/>
+    <dgm:txLinClrLst/>
+    <dgm:txFillClrLst meth="repeat">
+      <a:schemeClr val="lt1"/>
+    </dgm:txFillClrLst>
+    <dgm:txEffectClrLst/>
+  </dgm:styleLbl>
+  <dgm:styleLbl name="sibTrans2D1">
+    <dgm:fillClrLst meth="repeat">
+      <a:schemeClr val="accent1">
+        <a:tint val="60000"/>
+      </a:schemeClr>
+    </dgm:fillClrLst>
+    <dgm:linClrLst meth="repeat">
+      <a:schemeClr val="accent1">
+        <a:tint val="60000"/>
+      </a:schemeClr>
+    </dgm:linClrLst>
+    <dgm:effectClrLst/>
+    <dgm:txLinClrLst/>
+    <dgm:txFillClrLst/>
+    <dgm:txEffectClrLst/>
+  </dgm:styleLbl>
+  <dgm:styleLbl name="fgSibTrans2D1">
+    <dgm:fillClrLst meth="repeat">
+      <a:schemeClr val="accent1">
+        <a:tint val="60000"/>
+      </a:schemeClr>
+    </dgm:fillClrLst>
+    <dgm:linClrLst meth="repeat">
+      <a:schemeClr val="accent1">
+        <a:tint val="60000"/>
+      </a:schemeClr>
+    </dgm:linClrLst>
+    <dgm:effectClrLst/>
+    <dgm:txLinClrLst/>
+    <dgm:txFillClrLst/>
+    <dgm:txEffectClrLst/>
+  </dgm:styleLbl>
+  <dgm:styleLbl name="bgSibTrans2D1">
+    <dgm:fillClrLst meth="repeat">
+      <a:schemeClr val="accent1">
+        <a:tint val="60000"/>
+      </a:schemeClr>
+    </dgm:fillClrLst>
+    <dgm:linClrLst meth="repeat">
+      <a:schemeClr val="accent1">
+        <a:tint val="60000"/>
+      </a:schemeClr>
+    </dgm:linClrLst>
+    <dgm:effectClrLst/>
+    <dgm:txLinClrLst/>
+    <dgm:txFillClrLst/>
+    <dgm:txEffectClrLst/>
+  </dgm:styleLbl>
+  <dgm:styleLbl name="sibTrans1D1">
+    <dgm:fillClrLst meth="repeat">
+      <a:schemeClr val="accent1"/>
+    </dgm:fillClrLst>
+    <dgm:linClrLst meth="repeat">
+      <a:schemeClr val="accent1"/>
+    </dgm:linClrLst>
+    <dgm:effectClrLst/>
+    <dgm:txLinClrLst/>
+    <dgm:txFillClrLst meth="repeat">
+      <a:schemeClr val="tx1"/>
+    </dgm:txFillClrLst>
+    <dgm:txEffectClrLst/>
+  </dgm:styleLbl>
+  <dgm:styleLbl name="callout">
+    <dgm:fillClrLst meth="repeat">
+      <a:schemeClr val="accent1"/>
+    </dgm:fillClrLst>
+    <dgm:linClrLst meth="repeat">
+      <a:schemeClr val="accent1">
+        <a:tint val="50000"/>
+      </a:schemeClr>
+    </dgm:linClrLst>
+    <dgm:effectClrLst/>
+    <dgm:txLinClrLst/>
+    <dgm:txFillClrLst meth="repeat">
+      <a:schemeClr val="tx1"/>
+    </dgm:txFillClrLst>
+    <dgm:txEffectClrLst/>
+  </dgm:styleLbl>
+  <dgm:styleLbl name="asst0">
+    <dgm:fillClrLst meth="repeat">
+      <a:schemeClr val="accent1"/>
+    </dgm:fillClrLst>
+    <dgm:linClrLst meth="repeat">
+      <a:schemeClr val="lt1"/>
+    </dgm:linClrLst>
+    <dgm:effectClrLst/>
+    <dgm:txLinClrLst/>
+    <dgm:txFillClrLst/>
+    <dgm:txEffectClrLst/>
+  </dgm:styleLbl>
+  <dgm:styleLbl name="asst1">
+    <dgm:fillClrLst meth="repeat">
+      <a:schemeClr val="accent1"/>
+    </dgm:fillClrLst>
+    <dgm:linClrLst meth="repeat">
+      <a:schemeClr val="lt1"/>
+    </dgm:linClrLst>
+    <dgm:effectClrLst/>
+    <dgm:txLinClrLst/>
+    <dgm:txFillClrLst/>
+    <dgm:txEffectClrLst/>
+  </dgm:styleLbl>
+  <dgm:styleLbl name="asst2">
+    <dgm:fillClrLst meth="repeat">
+      <a:schemeClr val="accent1"/>
+    </dgm:fillClrLst>
+    <dgm:linClrLst meth="repeat">
+      <a:schemeClr val="lt1"/>
+    </dgm:linClrLst>
+    <dgm:effectClrLst/>
+    <dgm:txLinClrLst/>
+    <dgm:txFillClrLst/>
+    <dgm:txEffectClrLst/>
+  </dgm:styleLbl>
+  <dgm:styleLbl name="asst3">
+    <dgm:fillClrLst meth="repeat">
+      <a:schemeClr val="accent1"/>
+    </dgm:fillClrLst>
+    <dgm:linClrLst meth="repeat">
+      <a:schemeClr val="lt1"/>
+    </dgm:linClrLst>
+    <dgm:effectClrLst/>
+    <dgm:txLinClrLst/>
+    <dgm:txFillClrLst/>
+    <dgm:txEffectClrLst/>
+  </dgm:styleLbl>
+  <dgm:styleLbl name="asst4">
+    <dgm:fillClrLst meth="repeat">
+      <a:schemeClr val="accent1"/>
+    </dgm:fillClrLst>
+    <dgm:linClrLst meth="repeat">
+      <a:schemeClr val="lt1"/>
+    </dgm:linClrLst>
+    <dgm:effectClrLst/>
+    <dgm:txLinClrLst/>
+    <dgm:txFillClrLst/>
+    <dgm:txEffectClrLst/>
+  </dgm:styleLbl>
+  <dgm:styleLbl name="parChTrans2D1">
+    <dgm:fillClrLst meth="repeat">
+      <a:schemeClr val="accent1">
+        <a:tint val="60000"/>
+      </a:schemeClr>
+    </dgm:fillClrLst>
+    <dgm:linClrLst meth="repeat">
+      <a:schemeClr val="accent1">
+        <a:tint val="60000"/>
+      </a:schemeClr>
+    </dgm:linClrLst>
+    <dgm:effectClrLst/>
+    <dgm:txLinClrLst/>
+    <dgm:txFillClrLst meth="repeat">
+      <a:schemeClr val="lt1"/>
+    </dgm:txFillClrLst>
+    <dgm:txEffectClrLst/>
+  </dgm:styleLbl>
+  <dgm:styleLbl name="parChTrans2D2">
+    <dgm:fillClrLst meth="repeat">
+      <a:schemeClr val="accent1"/>
+    </dgm:fillClrLst>
+    <dgm:linClrLst meth="repeat">
+      <a:schemeClr val="accent1"/>
+    </dgm:linClrLst>
+    <dgm:effectClrLst/>
+    <dgm:txLinClrLst/>
+    <dgm:txFillClrLst meth="repeat">
+      <a:schemeClr val="lt1"/>
+    </dgm:txFillClrLst>
+    <dgm:txEffectClrLst/>
+  </dgm:styleLbl>
+  <dgm:styleLbl name="parChTrans2D3">
+    <dgm:fillClrLst meth="repeat">
+      <a:schemeClr val="accent1"/>
+    </dgm:fillClrLst>
+    <dgm:linClrLst meth="repeat">
+      <a:schemeClr val="accent1"/>
+    </dgm:linClrLst>
+    <dgm:effectClrLst/>
+    <dgm:txLinClrLst/>
+    <dgm:txFillClrLst meth="repeat">
+      <a:schemeClr val="lt1"/>
+    </dgm:txFillClrLst>
+    <dgm:txEffectClrLst/>
+  </dgm:styleLbl>
+  <dgm:styleLbl name="parChTrans2D4">
+    <dgm:fillClrLst meth="repeat">
+      <a:schemeClr val="accent1"/>
+    </dgm:fillClrLst>
+    <dgm:linClrLst meth="repeat">
+      <a:schemeClr val="accent1"/>
+    </dgm:linClrLst>
+    <dgm:effectClrLst/>
+    <dgm:txLinClrLst/>
+    <dgm:txFillClrLst meth="repeat">
+      <a:schemeClr val="lt1"/>
+    </dgm:txFillClrLst>
+    <dgm:txEffectClrLst/>
+  </dgm:styleLbl>
+  <dgm:styleLbl name="parChTrans1D1">
+    <dgm:fillClrLst meth="repeat">
+      <a:schemeClr val="accent1"/>
+    </dgm:fillClrLst>
+    <dgm:linClrLst meth="repeat">
+      <a:schemeClr val="accent1">
+        <a:shade val="60000"/>
+      </a:schemeClr>
+    </dgm:linClrLst>
+    <dgm:effectClrLst/>
+    <dgm:txLinClrLst/>
+    <dgm:txFillClrLst meth="repeat">
+      <a:schemeClr val="tx1"/>
+    </dgm:txFillClrLst>
+    <dgm:txEffectClrLst/>
+  </dgm:styleLbl>
+  <dgm:styleLbl name="parChTrans1D2">
+    <dgm:fillClrLst meth="repeat">
+      <a:schemeClr val="accent1"/>
+    </dgm:fillClrLst>
+    <dgm:linClrLst meth="repeat">
+      <a:schemeClr val="accent1">
+        <a:shade val="60000"/>
+      </a:schemeClr>
+    </dgm:linClrLst>
+    <dgm:effectClrLst/>
+    <dgm:txLinClrLst/>
+    <dgm:txFillClrLst meth="repeat">
+      <a:schemeClr val="tx1"/>
+    </dgm:txFillClrLst>
+    <dgm:txEffectClrLst/>
+  </dgm:styleLbl>
+  <dgm:styleLbl name="parChTrans1D3">
+    <dgm:fillClrLst meth="repeat">
+      <a:schemeClr val="accent1"/>
+    </dgm:fillClrLst>
+    <dgm:linClrLst meth="repeat">
+      <a:schemeClr val="accent1">
+        <a:shade val="80000"/>
+      </a:schemeClr>
+    </dgm:linClrLst>
+    <dgm:effectClrLst/>
+    <dgm:txLinClrLst/>
+    <dgm:txFillClrLst meth="repeat">
+      <a:schemeClr val="tx1"/>
+    </dgm:txFillClrLst>
+    <dgm:txEffectClrLst/>
+  </dgm:styleLbl>
+  <dgm:styleLbl name="parChTrans1D4">
+    <dgm:fillClrLst meth="repeat">
+      <a:schemeClr val="accent1"/>
+    </dgm:fillClrLst>
+    <dgm:linClrLst meth="repeat">
+      <a:schemeClr val="accent1">
+        <a:shade val="80000"/>
+      </a:schemeClr>
+    </dgm:linClrLst>
+    <dgm:effectClrLst/>
+    <dgm:txLinClrLst/>
+    <dgm:txFillClrLst meth="repeat">
+      <a:schemeClr val="tx1"/>
+    </dgm:txFillClrLst>
+    <dgm:txEffectClrLst/>
+  </dgm:styleLbl>
+  <dgm:styleLbl name="fgAcc1">
+    <dgm:fillClrLst meth="repeat">
+      <a:schemeClr val="lt1">
+        <a:alpha val="90000"/>
+      </a:schemeClr>
+    </dgm:fillClrLst>
+    <dgm:linClrLst meth="repeat">
+      <a:schemeClr val="accent1"/>
+    </dgm:linClrLst>
+    <dgm:effectClrLst/>
+    <dgm:txLinClrLst/>
+    <dgm:txFillClrLst meth="repeat">
+      <a:schemeClr val="dk1"/>
+    </dgm:txFillClrLst>
+    <dgm:txEffectClrLst/>
+  </dgm:styleLbl>
+  <dgm:styleLbl name="conFgAcc1">
+    <dgm:fillClrLst meth="repeat">
+      <a:schemeClr val="lt1">
+        <a:alpha val="90000"/>
+      </a:schemeClr>
+    </dgm:fillClrLst>
+    <dgm:linClrLst meth="repeat">
+      <a:schemeClr val="accent1"/>
+    </dgm:linClrLst>
+    <dgm:effectClrLst/>
+    <dgm:txLinClrLst/>
+    <dgm:txFillClrLst meth="repeat">
+      <a:schemeClr val="dk1"/>
+    </dgm:txFillClrLst>
+    <dgm:txEffectClrLst/>
+  </dgm:styleLbl>
+  <dgm:styleLbl name="alignAcc1">
+    <dgm:fillClrLst meth="repeat">
+      <a:schemeClr val="lt1">
+        <a:alpha val="90000"/>
+      </a:schemeClr>
+    </dgm:fillClrLst>
+    <dgm:linClrLst meth="repeat">
+      <a:schemeClr val="accent1"/>
+    </dgm:linClrLst>
+    <dgm:effectClrLst/>
+    <dgm:txLinClrLst/>
+    <dgm:txFillClrLst meth="repeat">
+      <a:schemeClr val="dk1"/>
+    </dgm:txFillClrLst>
+    <dgm:txEffectClrLst/>
+  </dgm:styleLbl>
+  <dgm:styleLbl name="trAlignAcc1">
+    <dgm:fillClrLst meth="repeat">
+      <a:schemeClr val="lt1">
+        <a:alpha val="40000"/>
+      </a:schemeClr>
+    </dgm:fillClrLst>
+    <dgm:linClrLst meth="repeat">
+      <a:schemeClr val="accent1"/>
+    </dgm:linClrLst>
+    <dgm:effectClrLst/>
+    <dgm:txLinClrLst/>
+    <dgm:txFillClrLst meth="repeat">
+      <a:schemeClr val="dk1"/>
+    </dgm:txFillClrLst>
+    <dgm:txEffectClrLst/>
+  </dgm:styleLbl>
+  <dgm:styleLbl name="bgAcc1">
+    <dgm:fillClrLst meth="repeat">
+      <a:schemeClr val="lt1">
+        <a:alpha val="90000"/>
+      </a:schemeClr>
+    </dgm:fillClrLst>
+    <dgm:linClrLst meth="repeat">
+      <a:schemeClr val="accent1"/>
+    </dgm:linClrLst>
+    <dgm:effectClrLst/>
+    <dgm:txLinClrLst/>
+    <dgm:txFillClrLst meth="repeat">
+      <a:schemeClr val="dk1"/>
+    </dgm:txFillClrLst>
+    <dgm:txEffectClrLst/>
+  </dgm:styleLbl>
+  <dgm:styleLbl name="solidFgAcc1">
+    <dgm:fillClrLst meth="repeat">
+      <a:schemeClr val="lt1"/>
+    </dgm:fillClrLst>
+    <dgm:linClrLst meth="repeat">
+      <a:schemeClr val="accent1"/>
+    </dgm:linClrLst>
+    <dgm:effectClrLst/>
+    <dgm:txLinClrLst/>
+    <dgm:txFillClrLst meth="repeat">
+      <a:schemeClr val="dk1"/>
+    </dgm:txFillClrLst>
+    <dgm:txEffectClrLst/>
+  </dgm:styleLbl>
+  <dgm:styleLbl name="solidAlignAcc1">
+    <dgm:fillClrLst meth="repeat">
+      <a:schemeClr val="lt1"/>
+    </dgm:fillClrLst>
+    <dgm:linClrLst meth="repeat">
+      <a:schemeClr val="accent1"/>
+    </dgm:linClrLst>
+    <dgm:effectClrLst/>
+    <dgm:txLinClrLst/>
+    <dgm:txFillClrLst meth="repeat">
+      <a:schemeClr val="dk1"/>
+    </dgm:txFillClrLst>
+    <dgm:txEffectClrLst/>
+  </dgm:styleLbl>
+  <dgm:styleLbl name="solidBgAcc1">
+    <dgm:fillClrLst meth="repeat">
+      <a:schemeClr val="lt1"/>
+    </dgm:fillClrLst>
+    <dgm:linClrLst meth="repeat">
+      <a:schemeClr val="accent1"/>
+    </dgm:linClrLst>
+    <dgm:effectClrLst/>
+    <dgm:txLinClrLst/>
+    <dgm:txFillClrLst meth="repeat">
+      <a:schemeClr val="dk1"/>
+    </dgm:txFillClrLst>
+    <dgm:txEffectClrLst/>
+  </dgm:styleLbl>
+  <dgm:styleLbl name="fgAccFollowNode1">
+    <dgm:fillClrLst meth="repeat">
+      <a:schemeClr val="accent1">
+        <a:alpha val="90000"/>
+        <a:tint val="40000"/>
+      </a:schemeClr>
+    </dgm:fillClrLst>
+    <dgm:linClrLst meth="repeat">
+      <a:schemeClr val="accent1">
+        <a:alpha val="90000"/>
+        <a:tint val="40000"/>
+      </a:schemeClr>
+    </dgm:linClrLst>
+    <dgm:effectClrLst/>
+    <dgm:txLinClrLst/>
+    <dgm:txFillClrLst meth="repeat">
+      <a:schemeClr val="dk1"/>
+    </dgm:txFillClrLst>
+    <dgm:txEffectClrLst/>
+  </dgm:styleLbl>
+  <dgm:styleLbl name="alignAccFollowNode1">
+    <dgm:fillClrLst meth="repeat">
+      <a:schemeClr val="accent1">
+        <a:alpha val="90000"/>
+        <a:tint val="40000"/>
+      </a:schemeClr>
+    </dgm:fillClrLst>
+    <dgm:linClrLst meth="repeat">
+      <a:schemeClr val="accent1">
+        <a:alpha val="90000"/>
+        <a:tint val="40000"/>
+      </a:schemeClr>
+    </dgm:linClrLst>
+    <dgm:effectClrLst/>
+    <dgm:txLinClrLst/>
+    <dgm:txFillClrLst meth="repeat">
+      <a:schemeClr val="dk1"/>
+    </dgm:txFillClrLst>
+    <dgm:txEffectClrLst/>
+  </dgm:styleLbl>
+  <dgm:styleLbl name="bgAccFollowNode1">
+    <dgm:fillClrLst meth="repeat">
+      <a:schemeClr val="accent1">
+        <a:alpha val="90000"/>
+        <a:tint val="40000"/>
+      </a:schemeClr>
+    </dgm:fillClrLst>
+    <dgm:linClrLst meth="repeat">
+      <a:schemeClr val="accent1">
+        <a:alpha val="90000"/>
+        <a:tint val="40000"/>
+      </a:schemeClr>
+    </dgm:linClrLst>
+    <dgm:effectClrLst/>
+    <dgm:txLinClrLst/>
+    <dgm:txFillClrLst meth="repeat">
+      <a:schemeClr val="dk1"/>
+    </dgm:txFillClrLst>
+    <dgm:txEffectClrLst/>
+  </dgm:styleLbl>
+  <dgm:styleLbl name="fgAcc0">
+    <dgm:fillClrLst meth="repeat">
+      <a:schemeClr val="lt1">
+        <a:alpha val="90000"/>
+      </a:schemeClr>
+    </dgm:fillClrLst>
+    <dgm:linClrLst meth="repeat">
+      <a:schemeClr val="accent1"/>
+    </dgm:linClrLst>
+    <dgm:effectClrLst/>
+    <dgm:txLinClrLst/>
+    <dgm:txFillClrLst meth="repeat">
+      <a:schemeClr val="dk1"/>
+    </dgm:txFillClrLst>
+    <dgm:txEffectClrLst/>
+  </dgm:styleLbl>
+  <dgm:styleLbl name="fgAcc2">
+    <dgm:fillClrLst meth="repeat">
+      <a:schemeClr val="lt1">
+        <a:alpha val="90000"/>
+      </a:schemeClr>
+    </dgm:fillClrLst>
+    <dgm:linClrLst meth="repeat">
+      <a:schemeClr val="accent1"/>
+    </dgm:linClrLst>
+    <dgm:effectClrLst/>
+    <dgm:txLinClrLst/>
+    <dgm:txFillClrLst meth="repeat">
+      <a:schemeClr val="dk1"/>
+    </dgm:txFillClrLst>
+    <dgm:txEffectClrLst/>
+  </dgm:styleLbl>
+  <dgm:styleLbl name="fgAcc3">
+    <dgm:fillClrLst meth="repeat">
+      <a:schemeClr val="lt1">
+        <a:alpha val="90000"/>
+      </a:schemeClr>
+    </dgm:fillClrLst>
+    <dgm:linClrLst meth="repeat">
+      <a:schemeClr val="accent1"/>
+    </dgm:linClrLst>
+    <dgm:effectClrLst/>
+    <dgm:txLinClrLst/>
+    <dgm:txFillClrLst meth="repeat">
+      <a:schemeClr val="dk1"/>
+    </dgm:txFillClrLst>
+    <dgm:txEffectClrLst/>
+  </dgm:styleLbl>
+  <dgm:styleLbl name="fgAcc4">
+    <dgm:fillClrLst meth="repeat">
+      <a:schemeClr val="lt1">
+        <a:alpha val="90000"/>
+      </a:schemeClr>
+    </dgm:fillClrLst>
+    <dgm:linClrLst meth="repeat">
+      <a:schemeClr val="accent1"/>
+    </dgm:linClrLst>
+    <dgm:effectClrLst/>
+    <dgm:txLinClrLst/>
+    <dgm:txFillClrLst meth="repeat">
+      <a:schemeClr val="dk1"/>
+    </dgm:txFillClrLst>
+    <dgm:txEffectClrLst/>
+  </dgm:styleLbl>
+  <dgm:styleLbl name="bgShp">
+    <dgm:fillClrLst meth="repeat">
+      <a:schemeClr val="accent1">
+        <a:tint val="40000"/>
+      </a:schemeClr>
+    </dgm:fillClrLst>
+    <dgm:linClrLst meth="repeat">
+      <a:schemeClr val="accent1"/>
+    </dgm:linClrLst>
+    <dgm:effectClrLst/>
+    <dgm:txLinClrLst/>
+    <dgm:txFillClrLst meth="repeat">
+      <a:schemeClr val="dk1"/>
+    </dgm:txFillClrLst>
+    <dgm:txEffectClrLst/>
+  </dgm:styleLbl>
+  <dgm:styleLbl name="dkBgShp">
+    <dgm:fillClrLst meth="repeat">
+      <a:schemeClr val="accent1">
+        <a:shade val="80000"/>
+      </a:schemeClr>
+    </dgm:fillClrLst>
+    <dgm:linClrLst meth="repeat">
+      <a:schemeClr val="accent1"/>
+    </dgm:linClrLst>
+    <dgm:effectClrLst/>
+    <dgm:txLinClrLst/>
+    <dgm:txFillClrLst meth="repeat">
+      <a:schemeClr val="lt1"/>
+    </dgm:txFillClrLst>
+    <dgm:txEffectClrLst/>
+  </dgm:styleLbl>
+  <dgm:styleLbl name="trBgShp">
+    <dgm:fillClrLst meth="repeat">
+      <a:schemeClr val="accent1">
+        <a:tint val="50000"/>
+        <a:alpha val="40000"/>
+      </a:schemeClr>
+    </dgm:fillClrLst>
+    <dgm:linClrLst meth="repeat">
+      <a:schemeClr val="accent1"/>
+    </dgm:linClrLst>
+    <dgm:effectClrLst/>
+    <dgm:txLinClrLst/>
+    <dgm:txFillClrLst meth="repeat">
+      <a:schemeClr val="lt1"/>
+    </dgm:txFillClrLst>
+    <dgm:txEffectClrLst/>
+  </dgm:styleLbl>
+  <dgm:styleLbl name="fgShp">
+    <dgm:fillClrLst meth="repeat">
+      <a:schemeClr val="accent1">
+        <a:tint val="60000"/>
+      </a:schemeClr>
+    </dgm:fillClrLst>
+    <dgm:linClrLst meth="repeat">
+      <a:schemeClr val="lt1"/>
+    </dgm:linClrLst>
+    <dgm:effectClrLst/>
+    <dgm:txLinClrLst/>
+    <dgm:txFillClrLst meth="repeat">
+      <a:schemeClr val="dk1"/>
+    </dgm:txFillClrLst>
+    <dgm:txEffectClrLst/>
+  </dgm:styleLbl>
+  <dgm:styleLbl name="revTx">
+    <dgm:fillClrLst meth="repeat">
+      <a:schemeClr val="lt1">
+        <a:alpha val="0"/>
+      </a:schemeClr>
+    </dgm:fillClrLst>
+    <dgm:linClrLst meth="repeat">
+      <a:schemeClr val="dk1">
+        <a:alpha val="0"/>
+      </a:schemeClr>
+    </dgm:linClrLst>
+    <dgm:effectClrLst/>
+    <dgm:txLinClrLst/>
+    <dgm:txFillClrLst meth="repeat">
+      <a:schemeClr val="tx1"/>
+    </dgm:txFillClrLst>
+    <dgm:txEffectClrLst/>
+  </dgm:styleLbl>
+</dgm:colorsDef>
+</file>
+
 <file path=ppt/diagrams/data1.xml><?xml version="1.0" encoding="utf-8"?>
 <dgm:dataModel xmlns:dgm="http://schemas.openxmlformats.org/drawingml/2006/diagram" xmlns:a="http://schemas.openxmlformats.org/drawingml/2006/main">
   <dgm:ptLst>
@@ -982,6 +1730,251 @@
             <a:rPr lang="de-DE"/>
             <a:t>Algorithmus</a:t>
           </a:r>
+        </a:p>
+      </dgm:t>
+    </dgm:pt>
+    <dgm:pt modelId="{2FB47529-F867-5440-BFD0-502F438A43C0}" type="parTrans" cxnId="{32382E99-6567-5549-A41C-3A5FA3106C01}">
+      <dgm:prSet/>
+      <dgm:spPr/>
+      <dgm:t>
+        <a:bodyPr/>
+        <a:lstStyle/>
+        <a:p>
+          <a:endParaRPr lang="de-DE"/>
+        </a:p>
+      </dgm:t>
+    </dgm:pt>
+    <dgm:pt modelId="{943FB0F1-68C1-204B-A36D-064759E8E18C}" type="sibTrans" cxnId="{32382E99-6567-5549-A41C-3A5FA3106C01}">
+      <dgm:prSet/>
+      <dgm:spPr>
+        <a:solidFill>
+          <a:srgbClr val="1A944D">
+            <a:alpha val="40000"/>
+          </a:srgbClr>
+        </a:solidFill>
+      </dgm:spPr>
+      <dgm:t>
+        <a:bodyPr/>
+        <a:lstStyle/>
+        <a:p>
+          <a:endParaRPr lang="de-DE"/>
+        </a:p>
+      </dgm:t>
+    </dgm:pt>
+    <dgm:pt modelId="{79F17AC2-3DA5-2748-AB9E-0529AB63DF86}" type="pres">
+      <dgm:prSet presAssocID="{F7B0E017-543B-4147-AE50-AC7A8C33E517}" presName="cycle" presStyleCnt="0">
+        <dgm:presLayoutVars>
+          <dgm:dir/>
+          <dgm:resizeHandles val="exact"/>
+        </dgm:presLayoutVars>
+      </dgm:prSet>
+      <dgm:spPr/>
+    </dgm:pt>
+    <dgm:pt modelId="{86C384A0-18D5-AF49-BCED-EE4DD7D34D1A}" type="pres">
+      <dgm:prSet presAssocID="{C38B08AF-CE08-5849-A8A6-98DC2239060B}" presName="node" presStyleLbl="node1" presStyleIdx="0" presStyleCnt="3">
+        <dgm:presLayoutVars>
+          <dgm:bulletEnabled val="1"/>
+        </dgm:presLayoutVars>
+      </dgm:prSet>
+      <dgm:spPr/>
+    </dgm:pt>
+    <dgm:pt modelId="{3E3C26FF-2EEA-F649-9D81-4087C30A5745}" type="pres">
+      <dgm:prSet presAssocID="{195E0BC4-50AD-5144-9E76-1EAB950974AE}" presName="sibTrans" presStyleLbl="sibTrans2D1" presStyleIdx="0" presStyleCnt="3"/>
+      <dgm:spPr/>
+    </dgm:pt>
+    <dgm:pt modelId="{1CFBEFEC-9F19-E849-B5C2-DB57791410BE}" type="pres">
+      <dgm:prSet presAssocID="{195E0BC4-50AD-5144-9E76-1EAB950974AE}" presName="connectorText" presStyleLbl="sibTrans2D1" presStyleIdx="0" presStyleCnt="3"/>
+      <dgm:spPr/>
+    </dgm:pt>
+    <dgm:pt modelId="{7C37B30B-D8E0-9946-A75D-931766CDB544}" type="pres">
+      <dgm:prSet presAssocID="{6FB608DA-2749-B949-8310-7E4660DB923D}" presName="node" presStyleLbl="node1" presStyleIdx="1" presStyleCnt="3">
+        <dgm:presLayoutVars>
+          <dgm:bulletEnabled val="1"/>
+        </dgm:presLayoutVars>
+      </dgm:prSet>
+      <dgm:spPr/>
+    </dgm:pt>
+    <dgm:pt modelId="{87E50781-8AE0-274C-B0A4-398D197F834D}" type="pres">
+      <dgm:prSet presAssocID="{1C8C2EE1-3756-F04F-9E78-0B5DDA1779FD}" presName="sibTrans" presStyleLbl="sibTrans2D1" presStyleIdx="1" presStyleCnt="3"/>
+      <dgm:spPr/>
+    </dgm:pt>
+    <dgm:pt modelId="{A79D9E6E-999F-B14F-9DA1-4158A9425238}" type="pres">
+      <dgm:prSet presAssocID="{1C8C2EE1-3756-F04F-9E78-0B5DDA1779FD}" presName="connectorText" presStyleLbl="sibTrans2D1" presStyleIdx="1" presStyleCnt="3"/>
+      <dgm:spPr/>
+    </dgm:pt>
+    <dgm:pt modelId="{EE57EF01-A100-2340-B78F-755F88412B78}" type="pres">
+      <dgm:prSet presAssocID="{E9882685-8D6F-6346-A295-CA83B0BAAE38}" presName="node" presStyleLbl="node1" presStyleIdx="2" presStyleCnt="3">
+        <dgm:presLayoutVars>
+          <dgm:bulletEnabled val="1"/>
+        </dgm:presLayoutVars>
+      </dgm:prSet>
+      <dgm:spPr/>
+    </dgm:pt>
+    <dgm:pt modelId="{CC20E61C-E71B-1146-BBF0-FFD2516525DD}" type="pres">
+      <dgm:prSet presAssocID="{943FB0F1-68C1-204B-A36D-064759E8E18C}" presName="sibTrans" presStyleLbl="sibTrans2D1" presStyleIdx="2" presStyleCnt="3"/>
+      <dgm:spPr/>
+    </dgm:pt>
+    <dgm:pt modelId="{EAF88AD2-57D0-E84C-A51A-89AE687BE124}" type="pres">
+      <dgm:prSet presAssocID="{943FB0F1-68C1-204B-A36D-064759E8E18C}" presName="connectorText" presStyleLbl="sibTrans2D1" presStyleIdx="2" presStyleCnt="3"/>
+      <dgm:spPr/>
+    </dgm:pt>
+  </dgm:ptLst>
+  <dgm:cxnLst>
+    <dgm:cxn modelId="{54D90B0B-34DD-814A-A808-ED253BA8F9C5}" srcId="{F7B0E017-543B-4147-AE50-AC7A8C33E517}" destId="{6FB608DA-2749-B949-8310-7E4660DB923D}" srcOrd="1" destOrd="0" parTransId="{1B746FA1-F6AD-C747-85C8-43A62D340350}" sibTransId="{1C8C2EE1-3756-F04F-9E78-0B5DDA1779FD}"/>
+    <dgm:cxn modelId="{0B297112-F751-9F4F-86B6-A8708129A3EF}" srcId="{F7B0E017-543B-4147-AE50-AC7A8C33E517}" destId="{C38B08AF-CE08-5849-A8A6-98DC2239060B}" srcOrd="0" destOrd="0" parTransId="{91C2C322-1191-EF4B-BF32-9DF0C6A98165}" sibTransId="{195E0BC4-50AD-5144-9E76-1EAB950974AE}"/>
+    <dgm:cxn modelId="{935A3057-5906-694D-B1FD-74C596133214}" type="presOf" srcId="{943FB0F1-68C1-204B-A36D-064759E8E18C}" destId="{EAF88AD2-57D0-E84C-A51A-89AE687BE124}" srcOrd="1" destOrd="0" presId="urn:microsoft.com/office/officeart/2005/8/layout/cycle2"/>
+    <dgm:cxn modelId="{69AB4769-A0E8-0C4C-A829-032CF120E5A4}" type="presOf" srcId="{1C8C2EE1-3756-F04F-9E78-0B5DDA1779FD}" destId="{A79D9E6E-999F-B14F-9DA1-4158A9425238}" srcOrd="1" destOrd="0" presId="urn:microsoft.com/office/officeart/2005/8/layout/cycle2"/>
+    <dgm:cxn modelId="{FED5DC81-E703-C24A-8356-95576ADB2ECE}" type="presOf" srcId="{E9882685-8D6F-6346-A295-CA83B0BAAE38}" destId="{EE57EF01-A100-2340-B78F-755F88412B78}" srcOrd="0" destOrd="0" presId="urn:microsoft.com/office/officeart/2005/8/layout/cycle2"/>
+    <dgm:cxn modelId="{AD165286-17EB-3146-BA22-2D1B76014D19}" type="presOf" srcId="{943FB0F1-68C1-204B-A36D-064759E8E18C}" destId="{CC20E61C-E71B-1146-BBF0-FFD2516525DD}" srcOrd="0" destOrd="0" presId="urn:microsoft.com/office/officeart/2005/8/layout/cycle2"/>
+    <dgm:cxn modelId="{32382E99-6567-5549-A41C-3A5FA3106C01}" srcId="{F7B0E017-543B-4147-AE50-AC7A8C33E517}" destId="{E9882685-8D6F-6346-A295-CA83B0BAAE38}" srcOrd="2" destOrd="0" parTransId="{2FB47529-F867-5440-BFD0-502F438A43C0}" sibTransId="{943FB0F1-68C1-204B-A36D-064759E8E18C}"/>
+    <dgm:cxn modelId="{F08DD19C-5B56-AD45-8E14-A28C8790A891}" type="presOf" srcId="{6FB608DA-2749-B949-8310-7E4660DB923D}" destId="{7C37B30B-D8E0-9946-A75D-931766CDB544}" srcOrd="0" destOrd="0" presId="urn:microsoft.com/office/officeart/2005/8/layout/cycle2"/>
+    <dgm:cxn modelId="{7FB132BF-C6EF-094E-85C4-FB1B404E42EC}" type="presOf" srcId="{1C8C2EE1-3756-F04F-9E78-0B5DDA1779FD}" destId="{87E50781-8AE0-274C-B0A4-398D197F834D}" srcOrd="0" destOrd="0" presId="urn:microsoft.com/office/officeart/2005/8/layout/cycle2"/>
+    <dgm:cxn modelId="{E186D2C2-B102-B144-B930-B15AF55F2BDD}" type="presOf" srcId="{F7B0E017-543B-4147-AE50-AC7A8C33E517}" destId="{79F17AC2-3DA5-2748-AB9E-0529AB63DF86}" srcOrd="0" destOrd="0" presId="urn:microsoft.com/office/officeart/2005/8/layout/cycle2"/>
+    <dgm:cxn modelId="{6359E3D4-5705-DE4B-8707-6688402AD6F8}" type="presOf" srcId="{C38B08AF-CE08-5849-A8A6-98DC2239060B}" destId="{86C384A0-18D5-AF49-BCED-EE4DD7D34D1A}" srcOrd="0" destOrd="0" presId="urn:microsoft.com/office/officeart/2005/8/layout/cycle2"/>
+    <dgm:cxn modelId="{BA48F7F3-1A12-404C-ABA7-C8A715B17C1C}" type="presOf" srcId="{195E0BC4-50AD-5144-9E76-1EAB950974AE}" destId="{1CFBEFEC-9F19-E849-B5C2-DB57791410BE}" srcOrd="1" destOrd="0" presId="urn:microsoft.com/office/officeart/2005/8/layout/cycle2"/>
+    <dgm:cxn modelId="{B35DC6FF-7807-D343-985A-E10395915B02}" type="presOf" srcId="{195E0BC4-50AD-5144-9E76-1EAB950974AE}" destId="{3E3C26FF-2EEA-F649-9D81-4087C30A5745}" srcOrd="0" destOrd="0" presId="urn:microsoft.com/office/officeart/2005/8/layout/cycle2"/>
+    <dgm:cxn modelId="{126DAE7D-2A07-9547-A50A-D8538334B8D1}" type="presParOf" srcId="{79F17AC2-3DA5-2748-AB9E-0529AB63DF86}" destId="{86C384A0-18D5-AF49-BCED-EE4DD7D34D1A}" srcOrd="0" destOrd="0" presId="urn:microsoft.com/office/officeart/2005/8/layout/cycle2"/>
+    <dgm:cxn modelId="{0934E089-2627-2840-AFE8-259977EF8F13}" type="presParOf" srcId="{79F17AC2-3DA5-2748-AB9E-0529AB63DF86}" destId="{3E3C26FF-2EEA-F649-9D81-4087C30A5745}" srcOrd="1" destOrd="0" presId="urn:microsoft.com/office/officeart/2005/8/layout/cycle2"/>
+    <dgm:cxn modelId="{6E42EC82-CDEE-FC48-9C22-A46642BA5346}" type="presParOf" srcId="{3E3C26FF-2EEA-F649-9D81-4087C30A5745}" destId="{1CFBEFEC-9F19-E849-B5C2-DB57791410BE}" srcOrd="0" destOrd="0" presId="urn:microsoft.com/office/officeart/2005/8/layout/cycle2"/>
+    <dgm:cxn modelId="{F00C753B-68BD-9044-A958-6760E61C48AF}" type="presParOf" srcId="{79F17AC2-3DA5-2748-AB9E-0529AB63DF86}" destId="{7C37B30B-D8E0-9946-A75D-931766CDB544}" srcOrd="2" destOrd="0" presId="urn:microsoft.com/office/officeart/2005/8/layout/cycle2"/>
+    <dgm:cxn modelId="{87ECF3D9-0333-5149-A3D2-F1C3CA86E779}" type="presParOf" srcId="{79F17AC2-3DA5-2748-AB9E-0529AB63DF86}" destId="{87E50781-8AE0-274C-B0A4-398D197F834D}" srcOrd="3" destOrd="0" presId="urn:microsoft.com/office/officeart/2005/8/layout/cycle2"/>
+    <dgm:cxn modelId="{C8DE825A-FD13-0A43-878C-27A4DDE8CF69}" type="presParOf" srcId="{87E50781-8AE0-274C-B0A4-398D197F834D}" destId="{A79D9E6E-999F-B14F-9DA1-4158A9425238}" srcOrd="0" destOrd="0" presId="urn:microsoft.com/office/officeart/2005/8/layout/cycle2"/>
+    <dgm:cxn modelId="{9A1B10BF-26E6-554F-88C0-023D14702E11}" type="presParOf" srcId="{79F17AC2-3DA5-2748-AB9E-0529AB63DF86}" destId="{EE57EF01-A100-2340-B78F-755F88412B78}" srcOrd="4" destOrd="0" presId="urn:microsoft.com/office/officeart/2005/8/layout/cycle2"/>
+    <dgm:cxn modelId="{4D54FF22-0AF0-F444-89A0-535BBE903522}" type="presParOf" srcId="{79F17AC2-3DA5-2748-AB9E-0529AB63DF86}" destId="{CC20E61C-E71B-1146-BBF0-FFD2516525DD}" srcOrd="5" destOrd="0" presId="urn:microsoft.com/office/officeart/2005/8/layout/cycle2"/>
+    <dgm:cxn modelId="{5BD78694-6103-FE42-8D89-B76F2D3805E0}" type="presParOf" srcId="{CC20E61C-E71B-1146-BBF0-FFD2516525DD}" destId="{EAF88AD2-57D0-E84C-A51A-89AE687BE124}" srcOrd="0" destOrd="0" presId="urn:microsoft.com/office/officeart/2005/8/layout/cycle2"/>
+  </dgm:cxnLst>
+  <dgm:bg/>
+  <dgm:whole/>
+  <dgm:extLst>
+    <a:ext uri="http://schemas.microsoft.com/office/drawing/2008/diagram">
+      <dsp:dataModelExt xmlns:dsp="http://schemas.microsoft.com/office/drawing/2008/diagram" relId="rId6" minVer="http://schemas.openxmlformats.org/drawingml/2006/diagram"/>
+    </a:ext>
+  </dgm:extLst>
+</dgm:dataModel>
+</file>
+
+<file path=ppt/diagrams/data2.xml><?xml version="1.0" encoding="utf-8"?>
+<dgm:dataModel xmlns:dgm="http://schemas.openxmlformats.org/drawingml/2006/diagram" xmlns:a="http://schemas.openxmlformats.org/drawingml/2006/main">
+  <dgm:ptLst>
+    <dgm:pt modelId="{F7B0E017-543B-4147-AE50-AC7A8C33E517}" type="doc">
+      <dgm:prSet loTypeId="urn:microsoft.com/office/officeart/2005/8/layout/cycle2" loCatId="" qsTypeId="urn:microsoft.com/office/officeart/2005/8/quickstyle/simple1" qsCatId="simple" csTypeId="urn:microsoft.com/office/officeart/2005/8/colors/accent1_2" csCatId="accent1" phldr="1"/>
+      <dgm:spPr/>
+      <dgm:t>
+        <a:bodyPr/>
+        <a:lstStyle/>
+        <a:p>
+          <a:endParaRPr lang="de-DE"/>
+        </a:p>
+      </dgm:t>
+    </dgm:pt>
+    <dgm:pt modelId="{C38B08AF-CE08-5849-A8A6-98DC2239060B}">
+      <dgm:prSet phldrT="[Text]"/>
+      <dgm:spPr>
+        <a:solidFill>
+          <a:srgbClr val="1A944D"/>
+        </a:solidFill>
+      </dgm:spPr>
+      <dgm:t>
+        <a:bodyPr/>
+        <a:lstStyle/>
+        <a:p>
+          <a:r>
+            <a:rPr lang="de-DE" dirty="0"/>
+            <a:t>User Interaction</a:t>
+          </a:r>
+        </a:p>
+      </dgm:t>
+    </dgm:pt>
+    <dgm:pt modelId="{91C2C322-1191-EF4B-BF32-9DF0C6A98165}" type="parTrans" cxnId="{0B297112-F751-9F4F-86B6-A8708129A3EF}">
+      <dgm:prSet/>
+      <dgm:spPr/>
+      <dgm:t>
+        <a:bodyPr/>
+        <a:lstStyle/>
+        <a:p>
+          <a:endParaRPr lang="de-DE"/>
+        </a:p>
+      </dgm:t>
+    </dgm:pt>
+    <dgm:pt modelId="{195E0BC4-50AD-5144-9E76-1EAB950974AE}" type="sibTrans" cxnId="{0B297112-F751-9F4F-86B6-A8708129A3EF}">
+      <dgm:prSet/>
+      <dgm:spPr>
+        <a:solidFill>
+          <a:srgbClr val="1A944D">
+            <a:alpha val="40000"/>
+          </a:srgbClr>
+        </a:solidFill>
+      </dgm:spPr>
+      <dgm:t>
+        <a:bodyPr/>
+        <a:lstStyle/>
+        <a:p>
+          <a:endParaRPr lang="de-DE"/>
+        </a:p>
+      </dgm:t>
+    </dgm:pt>
+    <dgm:pt modelId="{6FB608DA-2749-B949-8310-7E4660DB923D}">
+      <dgm:prSet phldrT="[Text]"/>
+      <dgm:spPr>
+        <a:solidFill>
+          <a:srgbClr val="1A944D"/>
+        </a:solidFill>
+      </dgm:spPr>
+      <dgm:t>
+        <a:bodyPr/>
+        <a:lstStyle/>
+        <a:p>
+          <a:r>
+            <a:rPr lang="de-DE" dirty="0"/>
+            <a:t>Data</a:t>
+          </a:r>
+        </a:p>
+      </dgm:t>
+    </dgm:pt>
+    <dgm:pt modelId="{1B746FA1-F6AD-C747-85C8-43A62D340350}" type="parTrans" cxnId="{54D90B0B-34DD-814A-A808-ED253BA8F9C5}">
+      <dgm:prSet/>
+      <dgm:spPr/>
+      <dgm:t>
+        <a:bodyPr/>
+        <a:lstStyle/>
+        <a:p>
+          <a:endParaRPr lang="de-DE"/>
+        </a:p>
+      </dgm:t>
+    </dgm:pt>
+    <dgm:pt modelId="{1C8C2EE1-3756-F04F-9E78-0B5DDA1779FD}" type="sibTrans" cxnId="{54D90B0B-34DD-814A-A808-ED253BA8F9C5}">
+      <dgm:prSet/>
+      <dgm:spPr>
+        <a:solidFill>
+          <a:srgbClr val="1A944D">
+            <a:alpha val="40000"/>
+          </a:srgbClr>
+        </a:solidFill>
+      </dgm:spPr>
+      <dgm:t>
+        <a:bodyPr/>
+        <a:lstStyle/>
+        <a:p>
+          <a:endParaRPr lang="de-DE"/>
+        </a:p>
+      </dgm:t>
+    </dgm:pt>
+    <dgm:pt modelId="{E9882685-8D6F-6346-A295-CA83B0BAAE38}">
+      <dgm:prSet phldrT="[Text]"/>
+      <dgm:spPr>
+        <a:solidFill>
+          <a:srgbClr val="1A944D"/>
+        </a:solidFill>
+      </dgm:spPr>
+      <dgm:t>
+        <a:bodyPr/>
+        <a:lstStyle/>
+        <a:p>
+          <a:r>
+            <a:rPr lang="de-DE" dirty="0" err="1"/>
+            <a:t>Algorithm</a:t>
+          </a:r>
+          <a:endParaRPr lang="de-DE" dirty="0"/>
         </a:p>
       </dgm:t>
     </dgm:pt>
@@ -1534,6 +2527,436 @@
 </dsp:drawing>
 </file>
 
+<file path=ppt/diagrams/drawing2.xml><?xml version="1.0" encoding="utf-8"?>
+<dsp:drawing xmlns:dgm="http://schemas.openxmlformats.org/drawingml/2006/diagram" xmlns:dsp="http://schemas.microsoft.com/office/drawing/2008/diagram" xmlns:a="http://schemas.openxmlformats.org/drawingml/2006/main">
+  <dsp:spTree>
+    <dsp:nvGrpSpPr>
+      <dsp:cNvPr id="0" name=""/>
+      <dsp:cNvGrpSpPr/>
+    </dsp:nvGrpSpPr>
+    <dsp:grpSpPr/>
+    <dsp:sp modelId="{86C384A0-18D5-AF49-BCED-EE4DD7D34D1A}">
+      <dsp:nvSpPr>
+        <dsp:cNvPr id="0" name=""/>
+        <dsp:cNvSpPr/>
+      </dsp:nvSpPr>
+      <dsp:spPr>
+        <a:xfrm>
+          <a:off x="4313039" y="1108"/>
+          <a:ext cx="1889521" cy="1889521"/>
+        </a:xfrm>
+        <a:prstGeom prst="ellipse">
+          <a:avLst/>
+        </a:prstGeom>
+        <a:solidFill>
+          <a:srgbClr val="1A944D"/>
+        </a:solidFill>
+        <a:ln w="19050" cap="flat" cmpd="sng" algn="ctr">
+          <a:solidFill>
+            <a:schemeClr val="lt1">
+              <a:hueOff val="0"/>
+              <a:satOff val="0"/>
+              <a:lumOff val="0"/>
+              <a:alphaOff val="0"/>
+            </a:schemeClr>
+          </a:solidFill>
+          <a:prstDash val="solid"/>
+          <a:miter lim="800000"/>
+        </a:ln>
+        <a:effectLst/>
+      </dsp:spPr>
+      <dsp:style>
+        <a:lnRef idx="2">
+          <a:scrgbClr r="0" g="0" b="0"/>
+        </a:lnRef>
+        <a:fillRef idx="1">
+          <a:scrgbClr r="0" g="0" b="0"/>
+        </a:fillRef>
+        <a:effectRef idx="0">
+          <a:scrgbClr r="0" g="0" b="0"/>
+        </a:effectRef>
+        <a:fontRef idx="minor">
+          <a:schemeClr val="lt1"/>
+        </a:fontRef>
+      </dsp:style>
+      <dsp:txBody>
+        <a:bodyPr spcFirstLastPara="0" vert="horz" wrap="square" lIns="26670" tIns="26670" rIns="26670" bIns="26670" numCol="1" spcCol="1270" anchor="ctr" anchorCtr="0">
+          <a:noAutofit/>
+        </a:bodyPr>
+        <a:lstStyle/>
+        <a:p>
+          <a:pPr marL="0" lvl="0" indent="0" algn="ctr" defTabSz="933450">
+            <a:lnSpc>
+              <a:spcPct val="90000"/>
+            </a:lnSpc>
+            <a:spcBef>
+              <a:spcPct val="0"/>
+            </a:spcBef>
+            <a:spcAft>
+              <a:spcPct val="35000"/>
+            </a:spcAft>
+            <a:buNone/>
+          </a:pPr>
+          <a:r>
+            <a:rPr lang="de-DE" sz="2100" kern="1200" dirty="0"/>
+            <a:t>User Interaction</a:t>
+          </a:r>
+        </a:p>
+      </dsp:txBody>
+      <dsp:txXfrm>
+        <a:off x="4589753" y="277822"/>
+        <a:ext cx="1336093" cy="1336093"/>
+      </dsp:txXfrm>
+    </dsp:sp>
+    <dsp:sp modelId="{3E3C26FF-2EEA-F649-9D81-4087C30A5745}">
+      <dsp:nvSpPr>
+        <dsp:cNvPr id="0" name=""/>
+        <dsp:cNvSpPr/>
+      </dsp:nvSpPr>
+      <dsp:spPr>
+        <a:xfrm rot="3600000">
+          <a:off x="5708792" y="1844463"/>
+          <a:ext cx="503807" cy="637713"/>
+        </a:xfrm>
+        <a:prstGeom prst="rightArrow">
+          <a:avLst>
+            <a:gd name="adj1" fmla="val 60000"/>
+            <a:gd name="adj2" fmla="val 50000"/>
+          </a:avLst>
+        </a:prstGeom>
+        <a:solidFill>
+          <a:srgbClr val="1A944D">
+            <a:alpha val="40000"/>
+          </a:srgbClr>
+        </a:solidFill>
+        <a:ln>
+          <a:noFill/>
+        </a:ln>
+        <a:effectLst/>
+      </dsp:spPr>
+      <dsp:style>
+        <a:lnRef idx="0">
+          <a:scrgbClr r="0" g="0" b="0"/>
+        </a:lnRef>
+        <a:fillRef idx="1">
+          <a:scrgbClr r="0" g="0" b="0"/>
+        </a:fillRef>
+        <a:effectRef idx="0">
+          <a:scrgbClr r="0" g="0" b="0"/>
+        </a:effectRef>
+        <a:fontRef idx="minor">
+          <a:schemeClr val="lt1"/>
+        </a:fontRef>
+      </dsp:style>
+      <dsp:txBody>
+        <a:bodyPr spcFirstLastPara="0" vert="horz" wrap="square" lIns="0" tIns="0" rIns="0" bIns="0" numCol="1" spcCol="1270" anchor="ctr" anchorCtr="0">
+          <a:noAutofit/>
+        </a:bodyPr>
+        <a:lstStyle/>
+        <a:p>
+          <a:pPr marL="0" lvl="0" indent="0" algn="ctr" defTabSz="755650">
+            <a:lnSpc>
+              <a:spcPct val="90000"/>
+            </a:lnSpc>
+            <a:spcBef>
+              <a:spcPct val="0"/>
+            </a:spcBef>
+            <a:spcAft>
+              <a:spcPct val="35000"/>
+            </a:spcAft>
+            <a:buNone/>
+          </a:pPr>
+          <a:endParaRPr lang="de-DE" sz="1700" kern="1200"/>
+        </a:p>
+      </dsp:txBody>
+      <dsp:txXfrm>
+        <a:off x="5746578" y="1906560"/>
+        <a:ext cx="352665" cy="382627"/>
+      </dsp:txXfrm>
+    </dsp:sp>
+    <dsp:sp modelId="{7C37B30B-D8E0-9946-A75D-931766CDB544}">
+      <dsp:nvSpPr>
+        <dsp:cNvPr id="0" name=""/>
+        <dsp:cNvSpPr/>
+      </dsp:nvSpPr>
+      <dsp:spPr>
+        <a:xfrm>
+          <a:off x="5733089" y="2460707"/>
+          <a:ext cx="1889521" cy="1889521"/>
+        </a:xfrm>
+        <a:prstGeom prst="ellipse">
+          <a:avLst/>
+        </a:prstGeom>
+        <a:solidFill>
+          <a:srgbClr val="1A944D"/>
+        </a:solidFill>
+        <a:ln w="19050" cap="flat" cmpd="sng" algn="ctr">
+          <a:solidFill>
+            <a:schemeClr val="lt1">
+              <a:hueOff val="0"/>
+              <a:satOff val="0"/>
+              <a:lumOff val="0"/>
+              <a:alphaOff val="0"/>
+            </a:schemeClr>
+          </a:solidFill>
+          <a:prstDash val="solid"/>
+          <a:miter lim="800000"/>
+        </a:ln>
+        <a:effectLst/>
+      </dsp:spPr>
+      <dsp:style>
+        <a:lnRef idx="2">
+          <a:scrgbClr r="0" g="0" b="0"/>
+        </a:lnRef>
+        <a:fillRef idx="1">
+          <a:scrgbClr r="0" g="0" b="0"/>
+        </a:fillRef>
+        <a:effectRef idx="0">
+          <a:scrgbClr r="0" g="0" b="0"/>
+        </a:effectRef>
+        <a:fontRef idx="minor">
+          <a:schemeClr val="lt1"/>
+        </a:fontRef>
+      </dsp:style>
+      <dsp:txBody>
+        <a:bodyPr spcFirstLastPara="0" vert="horz" wrap="square" lIns="26670" tIns="26670" rIns="26670" bIns="26670" numCol="1" spcCol="1270" anchor="ctr" anchorCtr="0">
+          <a:noAutofit/>
+        </a:bodyPr>
+        <a:lstStyle/>
+        <a:p>
+          <a:pPr marL="0" lvl="0" indent="0" algn="ctr" defTabSz="933450">
+            <a:lnSpc>
+              <a:spcPct val="90000"/>
+            </a:lnSpc>
+            <a:spcBef>
+              <a:spcPct val="0"/>
+            </a:spcBef>
+            <a:spcAft>
+              <a:spcPct val="35000"/>
+            </a:spcAft>
+            <a:buNone/>
+          </a:pPr>
+          <a:r>
+            <a:rPr lang="de-DE" sz="2100" kern="1200" dirty="0"/>
+            <a:t>Data</a:t>
+          </a:r>
+        </a:p>
+      </dsp:txBody>
+      <dsp:txXfrm>
+        <a:off x="6009803" y="2737421"/>
+        <a:ext cx="1336093" cy="1336093"/>
+      </dsp:txXfrm>
+    </dsp:sp>
+    <dsp:sp modelId="{87E50781-8AE0-274C-B0A4-398D197F834D}">
+      <dsp:nvSpPr>
+        <dsp:cNvPr id="0" name=""/>
+        <dsp:cNvSpPr/>
+      </dsp:nvSpPr>
+      <dsp:spPr>
+        <a:xfrm rot="10800000">
+          <a:off x="5020155" y="3086612"/>
+          <a:ext cx="503807" cy="637713"/>
+        </a:xfrm>
+        <a:prstGeom prst="rightArrow">
+          <a:avLst>
+            <a:gd name="adj1" fmla="val 60000"/>
+            <a:gd name="adj2" fmla="val 50000"/>
+          </a:avLst>
+        </a:prstGeom>
+        <a:solidFill>
+          <a:srgbClr val="1A944D">
+            <a:alpha val="40000"/>
+          </a:srgbClr>
+        </a:solidFill>
+        <a:ln>
+          <a:noFill/>
+        </a:ln>
+        <a:effectLst/>
+      </dsp:spPr>
+      <dsp:style>
+        <a:lnRef idx="0">
+          <a:scrgbClr r="0" g="0" b="0"/>
+        </a:lnRef>
+        <a:fillRef idx="1">
+          <a:scrgbClr r="0" g="0" b="0"/>
+        </a:fillRef>
+        <a:effectRef idx="0">
+          <a:scrgbClr r="0" g="0" b="0"/>
+        </a:effectRef>
+        <a:fontRef idx="minor">
+          <a:schemeClr val="lt1"/>
+        </a:fontRef>
+      </dsp:style>
+      <dsp:txBody>
+        <a:bodyPr spcFirstLastPara="0" vert="horz" wrap="square" lIns="0" tIns="0" rIns="0" bIns="0" numCol="1" spcCol="1270" anchor="ctr" anchorCtr="0">
+          <a:noAutofit/>
+        </a:bodyPr>
+        <a:lstStyle/>
+        <a:p>
+          <a:pPr marL="0" lvl="0" indent="0" algn="ctr" defTabSz="755650">
+            <a:lnSpc>
+              <a:spcPct val="90000"/>
+            </a:lnSpc>
+            <a:spcBef>
+              <a:spcPct val="0"/>
+            </a:spcBef>
+            <a:spcAft>
+              <a:spcPct val="35000"/>
+            </a:spcAft>
+            <a:buNone/>
+          </a:pPr>
+          <a:endParaRPr lang="de-DE" sz="1700" kern="1200"/>
+        </a:p>
+      </dsp:txBody>
+      <dsp:txXfrm rot="10800000">
+        <a:off x="5171297" y="3214155"/>
+        <a:ext cx="352665" cy="382627"/>
+      </dsp:txXfrm>
+    </dsp:sp>
+    <dsp:sp modelId="{EE57EF01-A100-2340-B78F-755F88412B78}">
+      <dsp:nvSpPr>
+        <dsp:cNvPr id="0" name=""/>
+        <dsp:cNvSpPr/>
+      </dsp:nvSpPr>
+      <dsp:spPr>
+        <a:xfrm>
+          <a:off x="2892988" y="2460707"/>
+          <a:ext cx="1889521" cy="1889521"/>
+        </a:xfrm>
+        <a:prstGeom prst="ellipse">
+          <a:avLst/>
+        </a:prstGeom>
+        <a:solidFill>
+          <a:srgbClr val="1A944D"/>
+        </a:solidFill>
+        <a:ln w="19050" cap="flat" cmpd="sng" algn="ctr">
+          <a:solidFill>
+            <a:schemeClr val="lt1">
+              <a:hueOff val="0"/>
+              <a:satOff val="0"/>
+              <a:lumOff val="0"/>
+              <a:alphaOff val="0"/>
+            </a:schemeClr>
+          </a:solidFill>
+          <a:prstDash val="solid"/>
+          <a:miter lim="800000"/>
+        </a:ln>
+        <a:effectLst/>
+      </dsp:spPr>
+      <dsp:style>
+        <a:lnRef idx="2">
+          <a:scrgbClr r="0" g="0" b="0"/>
+        </a:lnRef>
+        <a:fillRef idx="1">
+          <a:scrgbClr r="0" g="0" b="0"/>
+        </a:fillRef>
+        <a:effectRef idx="0">
+          <a:scrgbClr r="0" g="0" b="0"/>
+        </a:effectRef>
+        <a:fontRef idx="minor">
+          <a:schemeClr val="lt1"/>
+        </a:fontRef>
+      </dsp:style>
+      <dsp:txBody>
+        <a:bodyPr spcFirstLastPara="0" vert="horz" wrap="square" lIns="26670" tIns="26670" rIns="26670" bIns="26670" numCol="1" spcCol="1270" anchor="ctr" anchorCtr="0">
+          <a:noAutofit/>
+        </a:bodyPr>
+        <a:lstStyle/>
+        <a:p>
+          <a:pPr marL="0" lvl="0" indent="0" algn="ctr" defTabSz="933450">
+            <a:lnSpc>
+              <a:spcPct val="90000"/>
+            </a:lnSpc>
+            <a:spcBef>
+              <a:spcPct val="0"/>
+            </a:spcBef>
+            <a:spcAft>
+              <a:spcPct val="35000"/>
+            </a:spcAft>
+            <a:buNone/>
+          </a:pPr>
+          <a:r>
+            <a:rPr lang="de-DE" sz="2100" kern="1200" dirty="0" err="1"/>
+            <a:t>Algorithm</a:t>
+          </a:r>
+          <a:endParaRPr lang="de-DE" sz="2100" kern="1200" dirty="0"/>
+        </a:p>
+      </dsp:txBody>
+      <dsp:txXfrm>
+        <a:off x="3169702" y="2737421"/>
+        <a:ext cx="1336093" cy="1336093"/>
+      </dsp:txXfrm>
+    </dsp:sp>
+    <dsp:sp modelId="{CC20E61C-E71B-1146-BBF0-FFD2516525DD}">
+      <dsp:nvSpPr>
+        <dsp:cNvPr id="0" name=""/>
+        <dsp:cNvSpPr/>
+      </dsp:nvSpPr>
+      <dsp:spPr>
+        <a:xfrm rot="18000000">
+          <a:off x="4288741" y="1869160"/>
+          <a:ext cx="503807" cy="637713"/>
+        </a:xfrm>
+        <a:prstGeom prst="rightArrow">
+          <a:avLst>
+            <a:gd name="adj1" fmla="val 60000"/>
+            <a:gd name="adj2" fmla="val 50000"/>
+          </a:avLst>
+        </a:prstGeom>
+        <a:solidFill>
+          <a:srgbClr val="1A944D">
+            <a:alpha val="40000"/>
+          </a:srgbClr>
+        </a:solidFill>
+        <a:ln>
+          <a:noFill/>
+        </a:ln>
+        <a:effectLst/>
+      </dsp:spPr>
+      <dsp:style>
+        <a:lnRef idx="0">
+          <a:scrgbClr r="0" g="0" b="0"/>
+        </a:lnRef>
+        <a:fillRef idx="1">
+          <a:scrgbClr r="0" g="0" b="0"/>
+        </a:fillRef>
+        <a:effectRef idx="0">
+          <a:scrgbClr r="0" g="0" b="0"/>
+        </a:effectRef>
+        <a:fontRef idx="minor">
+          <a:schemeClr val="lt1"/>
+        </a:fontRef>
+      </dsp:style>
+      <dsp:txBody>
+        <a:bodyPr spcFirstLastPara="0" vert="horz" wrap="square" lIns="0" tIns="0" rIns="0" bIns="0" numCol="1" spcCol="1270" anchor="ctr" anchorCtr="0">
+          <a:noAutofit/>
+        </a:bodyPr>
+        <a:lstStyle/>
+        <a:p>
+          <a:pPr marL="0" lvl="0" indent="0" algn="ctr" defTabSz="755650">
+            <a:lnSpc>
+              <a:spcPct val="90000"/>
+            </a:lnSpc>
+            <a:spcBef>
+              <a:spcPct val="0"/>
+            </a:spcBef>
+            <a:spcAft>
+              <a:spcPct val="35000"/>
+            </a:spcAft>
+            <a:buNone/>
+          </a:pPr>
+          <a:endParaRPr lang="de-DE" sz="1700" kern="1200"/>
+        </a:p>
+      </dsp:txBody>
+      <dsp:txXfrm>
+        <a:off x="4326527" y="2062149"/>
+        <a:ext cx="352665" cy="382627"/>
+      </dsp:txXfrm>
+    </dsp:sp>
+  </dsp:spTree>
+</dsp:drawing>
+</file>
+
 <file path=ppt/diagrams/layout1.xml><?xml version="1.0" encoding="utf-8"?>
 <dgm:layoutDef xmlns:dgm="http://schemas.openxmlformats.org/drawingml/2006/diagram" xmlns:a="http://schemas.openxmlformats.org/drawingml/2006/main" uniqueId="urn:microsoft.com/office/officeart/2005/8/layout/cycle2">
   <dgm:title val=""/>
@@ -1745,7 +3168,1252 @@
 </dgm:layoutDef>
 </file>
 
+<file path=ppt/diagrams/layout2.xml><?xml version="1.0" encoding="utf-8"?>
+<dgm:layoutDef xmlns:dgm="http://schemas.openxmlformats.org/drawingml/2006/diagram" xmlns:a="http://schemas.openxmlformats.org/drawingml/2006/main" uniqueId="urn:microsoft.com/office/officeart/2005/8/layout/cycle2">
+  <dgm:title val=""/>
+  <dgm:desc val=""/>
+  <dgm:catLst>
+    <dgm:cat type="cycle" pri="1000"/>
+    <dgm:cat type="convert" pri="10000"/>
+  </dgm:catLst>
+  <dgm:sampData>
+    <dgm:dataModel>
+      <dgm:ptLst>
+        <dgm:pt modelId="0" type="doc"/>
+        <dgm:pt modelId="1">
+          <dgm:prSet phldr="1"/>
+        </dgm:pt>
+        <dgm:pt modelId="2">
+          <dgm:prSet phldr="1"/>
+        </dgm:pt>
+        <dgm:pt modelId="3">
+          <dgm:prSet phldr="1"/>
+        </dgm:pt>
+        <dgm:pt modelId="4">
+          <dgm:prSet phldr="1"/>
+        </dgm:pt>
+        <dgm:pt modelId="5">
+          <dgm:prSet phldr="1"/>
+        </dgm:pt>
+      </dgm:ptLst>
+      <dgm:cxnLst>
+        <dgm:cxn modelId="6" srcId="0" destId="1" srcOrd="0" destOrd="0"/>
+        <dgm:cxn modelId="7" srcId="0" destId="2" srcOrd="1" destOrd="0"/>
+        <dgm:cxn modelId="8" srcId="0" destId="3" srcOrd="2" destOrd="0"/>
+        <dgm:cxn modelId="9" srcId="0" destId="4" srcOrd="3" destOrd="0"/>
+        <dgm:cxn modelId="10" srcId="0" destId="5" srcOrd="4" destOrd="0"/>
+      </dgm:cxnLst>
+      <dgm:bg/>
+      <dgm:whole/>
+    </dgm:dataModel>
+  </dgm:sampData>
+  <dgm:styleData>
+    <dgm:dataModel>
+      <dgm:ptLst>
+        <dgm:pt modelId="0" type="doc"/>
+        <dgm:pt modelId="1"/>
+        <dgm:pt modelId="2"/>
+        <dgm:pt modelId="3"/>
+      </dgm:ptLst>
+      <dgm:cxnLst>
+        <dgm:cxn modelId="4" srcId="0" destId="1" srcOrd="0" destOrd="0"/>
+        <dgm:cxn modelId="5" srcId="0" destId="2" srcOrd="1" destOrd="0"/>
+        <dgm:cxn modelId="6" srcId="0" destId="3" srcOrd="2" destOrd="0"/>
+      </dgm:cxnLst>
+      <dgm:bg/>
+      <dgm:whole/>
+    </dgm:dataModel>
+  </dgm:styleData>
+  <dgm:clrData>
+    <dgm:dataModel>
+      <dgm:ptLst>
+        <dgm:pt modelId="0" type="doc"/>
+        <dgm:pt modelId="1"/>
+        <dgm:pt modelId="2"/>
+        <dgm:pt modelId="3"/>
+        <dgm:pt modelId="4"/>
+        <dgm:pt modelId="5"/>
+        <dgm:pt modelId="6"/>
+      </dgm:ptLst>
+      <dgm:cxnLst>
+        <dgm:cxn modelId="7" srcId="0" destId="1" srcOrd="0" destOrd="0"/>
+        <dgm:cxn modelId="8" srcId="0" destId="2" srcOrd="1" destOrd="0"/>
+        <dgm:cxn modelId="9" srcId="0" destId="3" srcOrd="2" destOrd="0"/>
+        <dgm:cxn modelId="10" srcId="0" destId="4" srcOrd="3" destOrd="0"/>
+        <dgm:cxn modelId="11" srcId="0" destId="5" srcOrd="4" destOrd="0"/>
+        <dgm:cxn modelId="12" srcId="0" destId="6" srcOrd="5" destOrd="0"/>
+      </dgm:cxnLst>
+      <dgm:bg/>
+      <dgm:whole/>
+    </dgm:dataModel>
+  </dgm:clrData>
+  <dgm:layoutNode name="cycle">
+    <dgm:varLst>
+      <dgm:dir/>
+      <dgm:resizeHandles val="exact"/>
+    </dgm:varLst>
+    <dgm:choose name="Name0">
+      <dgm:if name="Name1" func="var" arg="dir" op="equ" val="norm">
+        <dgm:choose name="Name2">
+          <dgm:if name="Name3" axis="ch" ptType="node" func="cnt" op="gt" val="2">
+            <dgm:alg type="cycle">
+              <dgm:param type="stAng" val="0"/>
+              <dgm:param type="spanAng" val="360"/>
+            </dgm:alg>
+          </dgm:if>
+          <dgm:else name="Name4">
+            <dgm:alg type="cycle">
+              <dgm:param type="stAng" val="-90"/>
+              <dgm:param type="spanAng" val="360"/>
+            </dgm:alg>
+          </dgm:else>
+        </dgm:choose>
+      </dgm:if>
+      <dgm:else name="Name5">
+        <dgm:choose name="Name6">
+          <dgm:if name="Name7" axis="ch" ptType="node" func="cnt" op="gt" val="2">
+            <dgm:alg type="cycle">
+              <dgm:param type="stAng" val="0"/>
+              <dgm:param type="spanAng" val="-360"/>
+            </dgm:alg>
+          </dgm:if>
+          <dgm:else name="Name8">
+            <dgm:alg type="cycle">
+              <dgm:param type="stAng" val="90"/>
+              <dgm:param type="spanAng" val="-360"/>
+            </dgm:alg>
+          </dgm:else>
+        </dgm:choose>
+      </dgm:else>
+    </dgm:choose>
+    <dgm:shape xmlns:r="http://schemas.openxmlformats.org/officeDocument/2006/relationships" r:blip="">
+      <dgm:adjLst/>
+    </dgm:shape>
+    <dgm:presOf/>
+    <dgm:constrLst>
+      <dgm:constr type="w" for="ch" ptType="node" refType="w"/>
+      <dgm:constr type="w" for="ch" ptType="sibTrans" refType="w" refFor="ch" refPtType="node" op="equ" fact="0.25"/>
+      <dgm:constr type="sibSp" refType="w" refFor="ch" refPtType="node" fact="0.5"/>
+      <dgm:constr type="primFontSz" for="ch" ptType="node" op="equ" val="65"/>
+      <dgm:constr type="primFontSz" for="des" forName="connectorText" op="equ" val="55"/>
+      <dgm:constr type="primFontSz" for="des" forName="connectorText" refType="primFontSz" refFor="ch" refPtType="node" op="lte" fact="0.8"/>
+    </dgm:constrLst>
+    <dgm:ruleLst/>
+    <dgm:forEach name="nodesForEach" axis="ch" ptType="node">
+      <dgm:layoutNode name="node">
+        <dgm:varLst>
+          <dgm:bulletEnabled val="1"/>
+        </dgm:varLst>
+        <dgm:alg type="tx">
+          <dgm:param type="txAnchorVertCh" val="mid"/>
+        </dgm:alg>
+        <dgm:shape xmlns:r="http://schemas.openxmlformats.org/officeDocument/2006/relationships" type="ellipse" r:blip="">
+          <dgm:adjLst/>
+        </dgm:shape>
+        <dgm:presOf axis="desOrSelf" ptType="node"/>
+        <dgm:constrLst>
+          <dgm:constr type="h" refType="w"/>
+          <dgm:constr type="lMarg" refType="primFontSz" fact="0.1"/>
+          <dgm:constr type="rMarg" refType="primFontSz" fact="0.1"/>
+          <dgm:constr type="tMarg" refType="primFontSz" fact="0.1"/>
+          <dgm:constr type="bMarg" refType="primFontSz" fact="0.1"/>
+        </dgm:constrLst>
+        <dgm:ruleLst>
+          <dgm:rule type="primFontSz" val="5" fact="NaN" max="NaN"/>
+        </dgm:ruleLst>
+      </dgm:layoutNode>
+      <dgm:choose name="Name9">
+        <dgm:if name="Name10" axis="par ch" ptType="doc node" func="cnt" op="gt" val="1">
+          <dgm:forEach name="sibTransForEach" axis="followSib" ptType="sibTrans" hideLastTrans="0" cnt="1">
+            <dgm:layoutNode name="sibTrans">
+              <dgm:choose name="Name11">
+                <dgm:if name="Name12" axis="par ch" ptType="doc node" func="cnt" op="lt" val="3">
+                  <dgm:alg type="conn">
+                    <dgm:param type="begPts" val="radial"/>
+                    <dgm:param type="endPts" val="radial"/>
+                  </dgm:alg>
+                </dgm:if>
+                <dgm:else name="Name13">
+                  <dgm:alg type="conn">
+                    <dgm:param type="begPts" val="auto"/>
+                    <dgm:param type="endPts" val="auto"/>
+                  </dgm:alg>
+                </dgm:else>
+              </dgm:choose>
+              <dgm:shape xmlns:r="http://schemas.openxmlformats.org/officeDocument/2006/relationships" type="conn" r:blip="">
+                <dgm:adjLst/>
+              </dgm:shape>
+              <dgm:presOf axis="self"/>
+              <dgm:constrLst>
+                <dgm:constr type="h" refType="w" fact="1.35"/>
+                <dgm:constr type="connDist"/>
+                <dgm:constr type="w" for="ch" refType="connDist" fact="0.45"/>
+                <dgm:constr type="h" for="ch" refType="h"/>
+              </dgm:constrLst>
+              <dgm:ruleLst/>
+              <dgm:layoutNode name="connectorText">
+                <dgm:alg type="tx">
+                  <dgm:param type="autoTxRot" val="grav"/>
+                </dgm:alg>
+                <dgm:shape xmlns:r="http://schemas.openxmlformats.org/officeDocument/2006/relationships" type="conn" r:blip="" hideGeom="1">
+                  <dgm:adjLst/>
+                </dgm:shape>
+                <dgm:presOf axis="self"/>
+                <dgm:constrLst>
+                  <dgm:constr type="lMarg"/>
+                  <dgm:constr type="rMarg"/>
+                  <dgm:constr type="tMarg"/>
+                  <dgm:constr type="bMarg"/>
+                </dgm:constrLst>
+                <dgm:ruleLst>
+                  <dgm:rule type="primFontSz" val="5" fact="NaN" max="NaN"/>
+                </dgm:ruleLst>
+              </dgm:layoutNode>
+            </dgm:layoutNode>
+          </dgm:forEach>
+        </dgm:if>
+        <dgm:else name="Name14"/>
+      </dgm:choose>
+    </dgm:forEach>
+  </dgm:layoutNode>
+</dgm:layoutDef>
+</file>
+
 <file path=ppt/diagrams/quickStyle1.xml><?xml version="1.0" encoding="utf-8"?>
+<dgm:styleDef xmlns:dgm="http://schemas.openxmlformats.org/drawingml/2006/diagram" xmlns:a="http://schemas.openxmlformats.org/drawingml/2006/main" uniqueId="urn:microsoft.com/office/officeart/2005/8/quickstyle/simple1">
+  <dgm:title val=""/>
+  <dgm:desc val=""/>
+  <dgm:catLst>
+    <dgm:cat type="simple" pri="10100"/>
+  </dgm:catLst>
+  <dgm:scene3d>
+    <a:camera prst="orthographicFront"/>
+    <a:lightRig rig="threePt" dir="t"/>
+  </dgm:scene3d>
+  <dgm:styleLbl name="node0">
+    <dgm:scene3d>
+      <a:camera prst="orthographicFront"/>
+      <a:lightRig rig="threePt" dir="t"/>
+    </dgm:scene3d>
+    <dgm:sp3d/>
+    <dgm:txPr/>
+    <dgm:style>
+      <a:lnRef idx="2">
+        <a:scrgbClr r="0" g="0" b="0"/>
+      </a:lnRef>
+      <a:fillRef idx="1">
+        <a:scrgbClr r="0" g="0" b="0"/>
+      </a:fillRef>
+      <a:effectRef idx="0">
+        <a:scrgbClr r="0" g="0" b="0"/>
+      </a:effectRef>
+      <a:fontRef idx="minor">
+        <a:schemeClr val="lt1"/>
+      </a:fontRef>
+    </dgm:style>
+  </dgm:styleLbl>
+  <dgm:styleLbl name="lnNode1">
+    <dgm:scene3d>
+      <a:camera prst="orthographicFront"/>
+      <a:lightRig rig="threePt" dir="t"/>
+    </dgm:scene3d>
+    <dgm:sp3d/>
+    <dgm:txPr/>
+    <dgm:style>
+      <a:lnRef idx="2">
+        <a:scrgbClr r="0" g="0" b="0"/>
+      </a:lnRef>
+      <a:fillRef idx="1">
+        <a:scrgbClr r="0" g="0" b="0"/>
+      </a:fillRef>
+      <a:effectRef idx="0">
+        <a:scrgbClr r="0" g="0" b="0"/>
+      </a:effectRef>
+      <a:fontRef idx="minor">
+        <a:schemeClr val="lt1"/>
+      </a:fontRef>
+    </dgm:style>
+  </dgm:styleLbl>
+  <dgm:styleLbl name="vennNode1">
+    <dgm:scene3d>
+      <a:camera prst="orthographicFront"/>
+      <a:lightRig rig="threePt" dir="t"/>
+    </dgm:scene3d>
+    <dgm:sp3d/>
+    <dgm:txPr/>
+    <dgm:style>
+      <a:lnRef idx="2">
+        <a:scrgbClr r="0" g="0" b="0"/>
+      </a:lnRef>
+      <a:fillRef idx="1">
+        <a:scrgbClr r="0" g="0" b="0"/>
+      </a:fillRef>
+      <a:effectRef idx="0">
+        <a:scrgbClr r="0" g="0" b="0"/>
+      </a:effectRef>
+      <a:fontRef idx="minor">
+        <a:schemeClr val="tx1"/>
+      </a:fontRef>
+    </dgm:style>
+  </dgm:styleLbl>
+  <dgm:styleLbl name="alignNode1">
+    <dgm:scene3d>
+      <a:camera prst="orthographicFront"/>
+      <a:lightRig rig="threePt" dir="t"/>
+    </dgm:scene3d>
+    <dgm:sp3d/>
+    <dgm:txPr/>
+    <dgm:style>
+      <a:lnRef idx="2">
+        <a:scrgbClr r="0" g="0" b="0"/>
+      </a:lnRef>
+      <a:fillRef idx="1">
+        <a:scrgbClr r="0" g="0" b="0"/>
+      </a:fillRef>
+      <a:effectRef idx="0">
+        <a:scrgbClr r="0" g="0" b="0"/>
+      </a:effectRef>
+      <a:fontRef idx="minor">
+        <a:schemeClr val="lt1"/>
+      </a:fontRef>
+    </dgm:style>
+  </dgm:styleLbl>
+  <dgm:styleLbl name="node1">
+    <dgm:scene3d>
+      <a:camera prst="orthographicFront"/>
+      <a:lightRig rig="threePt" dir="t"/>
+    </dgm:scene3d>
+    <dgm:sp3d/>
+    <dgm:txPr/>
+    <dgm:style>
+      <a:lnRef idx="2">
+        <a:scrgbClr r="0" g="0" b="0"/>
+      </a:lnRef>
+      <a:fillRef idx="1">
+        <a:scrgbClr r="0" g="0" b="0"/>
+      </a:fillRef>
+      <a:effectRef idx="0">
+        <a:scrgbClr r="0" g="0" b="0"/>
+      </a:effectRef>
+      <a:fontRef idx="minor">
+        <a:schemeClr val="lt1"/>
+      </a:fontRef>
+    </dgm:style>
+  </dgm:styleLbl>
+  <dgm:styleLbl name="node2">
+    <dgm:scene3d>
+      <a:camera prst="orthographicFront"/>
+      <a:lightRig rig="threePt" dir="t"/>
+    </dgm:scene3d>
+    <dgm:sp3d/>
+    <dgm:txPr/>
+    <dgm:style>
+      <a:lnRef idx="2">
+        <a:scrgbClr r="0" g="0" b="0"/>
+      </a:lnRef>
+      <a:fillRef idx="1">
+        <a:scrgbClr r="0" g="0" b="0"/>
+      </a:fillRef>
+      <a:effectRef idx="0">
+        <a:scrgbClr r="0" g="0" b="0"/>
+      </a:effectRef>
+      <a:fontRef idx="minor">
+        <a:schemeClr val="lt1"/>
+      </a:fontRef>
+    </dgm:style>
+  </dgm:styleLbl>
+  <dgm:styleLbl name="node3">
+    <dgm:scene3d>
+      <a:camera prst="orthographicFront"/>
+      <a:lightRig rig="threePt" dir="t"/>
+    </dgm:scene3d>
+    <dgm:sp3d/>
+    <dgm:txPr/>
+    <dgm:style>
+      <a:lnRef idx="2">
+        <a:scrgbClr r="0" g="0" b="0"/>
+      </a:lnRef>
+      <a:fillRef idx="1">
+        <a:scrgbClr r="0" g="0" b="0"/>
+      </a:fillRef>
+      <a:effectRef idx="0">
+        <a:scrgbClr r="0" g="0" b="0"/>
+      </a:effectRef>
+      <a:fontRef idx="minor">
+        <a:schemeClr val="lt1"/>
+      </a:fontRef>
+    </dgm:style>
+  </dgm:styleLbl>
+  <dgm:styleLbl name="node4">
+    <dgm:scene3d>
+      <a:camera prst="orthographicFront"/>
+      <a:lightRig rig="threePt" dir="t"/>
+    </dgm:scene3d>
+    <dgm:sp3d/>
+    <dgm:txPr/>
+    <dgm:style>
+      <a:lnRef idx="2">
+        <a:scrgbClr r="0" g="0" b="0"/>
+      </a:lnRef>
+      <a:fillRef idx="1">
+        <a:scrgbClr r="0" g="0" b="0"/>
+      </a:fillRef>
+      <a:effectRef idx="0">
+        <a:scrgbClr r="0" g="0" b="0"/>
+      </a:effectRef>
+      <a:fontRef idx="minor">
+        <a:schemeClr val="lt1"/>
+      </a:fontRef>
+    </dgm:style>
+  </dgm:styleLbl>
+  <dgm:styleLbl name="fgImgPlace1">
+    <dgm:scene3d>
+      <a:camera prst="orthographicFront"/>
+      <a:lightRig rig="threePt" dir="t"/>
+    </dgm:scene3d>
+    <dgm:sp3d/>
+    <dgm:txPr/>
+    <dgm:style>
+      <a:lnRef idx="2">
+        <a:scrgbClr r="0" g="0" b="0"/>
+      </a:lnRef>
+      <a:fillRef idx="1">
+        <a:scrgbClr r="0" g="0" b="0"/>
+      </a:fillRef>
+      <a:effectRef idx="0">
+        <a:scrgbClr r="0" g="0" b="0"/>
+      </a:effectRef>
+      <a:fontRef idx="minor"/>
+    </dgm:style>
+  </dgm:styleLbl>
+  <dgm:styleLbl name="alignImgPlace1">
+    <dgm:scene3d>
+      <a:camera prst="orthographicFront"/>
+      <a:lightRig rig="threePt" dir="t"/>
+    </dgm:scene3d>
+    <dgm:sp3d/>
+    <dgm:txPr/>
+    <dgm:style>
+      <a:lnRef idx="2">
+        <a:scrgbClr r="0" g="0" b="0"/>
+      </a:lnRef>
+      <a:fillRef idx="1">
+        <a:scrgbClr r="0" g="0" b="0"/>
+      </a:fillRef>
+      <a:effectRef idx="0">
+        <a:scrgbClr r="0" g="0" b="0"/>
+      </a:effectRef>
+      <a:fontRef idx="minor"/>
+    </dgm:style>
+  </dgm:styleLbl>
+  <dgm:styleLbl name="bgImgPlace1">
+    <dgm:scene3d>
+      <a:camera prst="orthographicFront"/>
+      <a:lightRig rig="threePt" dir="t"/>
+    </dgm:scene3d>
+    <dgm:sp3d/>
+    <dgm:txPr/>
+    <dgm:style>
+      <a:lnRef idx="2">
+        <a:scrgbClr r="0" g="0" b="0"/>
+      </a:lnRef>
+      <a:fillRef idx="1">
+        <a:scrgbClr r="0" g="0" b="0"/>
+      </a:fillRef>
+      <a:effectRef idx="0">
+        <a:scrgbClr r="0" g="0" b="0"/>
+      </a:effectRef>
+      <a:fontRef idx="minor"/>
+    </dgm:style>
+  </dgm:styleLbl>
+  <dgm:styleLbl name="sibTrans2D1">
+    <dgm:scene3d>
+      <a:camera prst="orthographicFront"/>
+      <a:lightRig rig="threePt" dir="t"/>
+    </dgm:scene3d>
+    <dgm:sp3d/>
+    <dgm:txPr/>
+    <dgm:style>
+      <a:lnRef idx="0">
+        <a:scrgbClr r="0" g="0" b="0"/>
+      </a:lnRef>
+      <a:fillRef idx="1">
+        <a:scrgbClr r="0" g="0" b="0"/>
+      </a:fillRef>
+      <a:effectRef idx="0">
+        <a:scrgbClr r="0" g="0" b="0"/>
+      </a:effectRef>
+      <a:fontRef idx="minor">
+        <a:schemeClr val="lt1"/>
+      </a:fontRef>
+    </dgm:style>
+  </dgm:styleLbl>
+  <dgm:styleLbl name="fgSibTrans2D1">
+    <dgm:scene3d>
+      <a:camera prst="orthographicFront"/>
+      <a:lightRig rig="threePt" dir="t"/>
+    </dgm:scene3d>
+    <dgm:sp3d/>
+    <dgm:txPr/>
+    <dgm:style>
+      <a:lnRef idx="0">
+        <a:scrgbClr r="0" g="0" b="0"/>
+      </a:lnRef>
+      <a:fillRef idx="1">
+        <a:scrgbClr r="0" g="0" b="0"/>
+      </a:fillRef>
+      <a:effectRef idx="0">
+        <a:scrgbClr r="0" g="0" b="0"/>
+      </a:effectRef>
+      <a:fontRef idx="minor">
+        <a:schemeClr val="lt1"/>
+      </a:fontRef>
+    </dgm:style>
+  </dgm:styleLbl>
+  <dgm:styleLbl name="bgSibTrans2D1">
+    <dgm:scene3d>
+      <a:camera prst="orthographicFront"/>
+      <a:lightRig rig="threePt" dir="t"/>
+    </dgm:scene3d>
+    <dgm:sp3d/>
+    <dgm:txPr/>
+    <dgm:style>
+      <a:lnRef idx="0">
+        <a:scrgbClr r="0" g="0" b="0"/>
+      </a:lnRef>
+      <a:fillRef idx="1">
+        <a:scrgbClr r="0" g="0" b="0"/>
+      </a:fillRef>
+      <a:effectRef idx="0">
+        <a:scrgbClr r="0" g="0" b="0"/>
+      </a:effectRef>
+      <a:fontRef idx="minor">
+        <a:schemeClr val="lt1"/>
+      </a:fontRef>
+    </dgm:style>
+  </dgm:styleLbl>
+  <dgm:styleLbl name="sibTrans1D1">
+    <dgm:scene3d>
+      <a:camera prst="orthographicFront"/>
+      <a:lightRig rig="threePt" dir="t"/>
+    </dgm:scene3d>
+    <dgm:sp3d/>
+    <dgm:txPr/>
+    <dgm:style>
+      <a:lnRef idx="1">
+        <a:scrgbClr r="0" g="0" b="0"/>
+      </a:lnRef>
+      <a:fillRef idx="0">
+        <a:scrgbClr r="0" g="0" b="0"/>
+      </a:fillRef>
+      <a:effectRef idx="0">
+        <a:scrgbClr r="0" g="0" b="0"/>
+      </a:effectRef>
+      <a:fontRef idx="minor"/>
+    </dgm:style>
+  </dgm:styleLbl>
+  <dgm:styleLbl name="callout">
+    <dgm:scene3d>
+      <a:camera prst="orthographicFront"/>
+      <a:lightRig rig="threePt" dir="t"/>
+    </dgm:scene3d>
+    <dgm:sp3d/>
+    <dgm:txPr/>
+    <dgm:style>
+      <a:lnRef idx="2">
+        <a:scrgbClr r="0" g="0" b="0"/>
+      </a:lnRef>
+      <a:fillRef idx="1">
+        <a:scrgbClr r="0" g="0" b="0"/>
+      </a:fillRef>
+      <a:effectRef idx="0">
+        <a:scrgbClr r="0" g="0" b="0"/>
+      </a:effectRef>
+      <a:fontRef idx="minor"/>
+    </dgm:style>
+  </dgm:styleLbl>
+  <dgm:styleLbl name="asst0">
+    <dgm:scene3d>
+      <a:camera prst="orthographicFront"/>
+      <a:lightRig rig="threePt" dir="t"/>
+    </dgm:scene3d>
+    <dgm:sp3d/>
+    <dgm:txPr/>
+    <dgm:style>
+      <a:lnRef idx="2">
+        <a:scrgbClr r="0" g="0" b="0"/>
+      </a:lnRef>
+      <a:fillRef idx="1">
+        <a:scrgbClr r="0" g="0" b="0"/>
+      </a:fillRef>
+      <a:effectRef idx="0">
+        <a:scrgbClr r="0" g="0" b="0"/>
+      </a:effectRef>
+      <a:fontRef idx="minor">
+        <a:schemeClr val="lt1"/>
+      </a:fontRef>
+    </dgm:style>
+  </dgm:styleLbl>
+  <dgm:styleLbl name="asst1">
+    <dgm:scene3d>
+      <a:camera prst="orthographicFront"/>
+      <a:lightRig rig="threePt" dir="t"/>
+    </dgm:scene3d>
+    <dgm:sp3d/>
+    <dgm:txPr/>
+    <dgm:style>
+      <a:lnRef idx="2">
+        <a:scrgbClr r="0" g="0" b="0"/>
+      </a:lnRef>
+      <a:fillRef idx="1">
+        <a:scrgbClr r="0" g="0" b="0"/>
+      </a:fillRef>
+      <a:effectRef idx="0">
+        <a:scrgbClr r="0" g="0" b="0"/>
+      </a:effectRef>
+      <a:fontRef idx="minor">
+        <a:schemeClr val="lt1"/>
+      </a:fontRef>
+    </dgm:style>
+  </dgm:styleLbl>
+  <dgm:styleLbl name="asst2">
+    <dgm:scene3d>
+      <a:camera prst="orthographicFront"/>
+      <a:lightRig rig="threePt" dir="t"/>
+    </dgm:scene3d>
+    <dgm:sp3d/>
+    <dgm:txPr/>
+    <dgm:style>
+      <a:lnRef idx="2">
+        <a:scrgbClr r="0" g="0" b="0"/>
+      </a:lnRef>
+      <a:fillRef idx="1">
+        <a:scrgbClr r="0" g="0" b="0"/>
+      </a:fillRef>
+      <a:effectRef idx="0">
+        <a:scrgbClr r="0" g="0" b="0"/>
+      </a:effectRef>
+      <a:fontRef idx="minor">
+        <a:schemeClr val="lt1"/>
+      </a:fontRef>
+    </dgm:style>
+  </dgm:styleLbl>
+  <dgm:styleLbl name="asst3">
+    <dgm:scene3d>
+      <a:camera prst="orthographicFront"/>
+      <a:lightRig rig="threePt" dir="t"/>
+    </dgm:scene3d>
+    <dgm:sp3d/>
+    <dgm:txPr/>
+    <dgm:style>
+      <a:lnRef idx="2">
+        <a:scrgbClr r="0" g="0" b="0"/>
+      </a:lnRef>
+      <a:fillRef idx="1">
+        <a:scrgbClr r="0" g="0" b="0"/>
+      </a:fillRef>
+      <a:effectRef idx="0">
+        <a:scrgbClr r="0" g="0" b="0"/>
+      </a:effectRef>
+      <a:fontRef idx="minor">
+        <a:schemeClr val="lt1"/>
+      </a:fontRef>
+    </dgm:style>
+  </dgm:styleLbl>
+  <dgm:styleLbl name="asst4">
+    <dgm:scene3d>
+      <a:camera prst="orthographicFront"/>
+      <a:lightRig rig="threePt" dir="t"/>
+    </dgm:scene3d>
+    <dgm:sp3d/>
+    <dgm:txPr/>
+    <dgm:style>
+      <a:lnRef idx="2">
+        <a:scrgbClr r="0" g="0" b="0"/>
+      </a:lnRef>
+      <a:fillRef idx="1">
+        <a:scrgbClr r="0" g="0" b="0"/>
+      </a:fillRef>
+      <a:effectRef idx="0">
+        <a:scrgbClr r="0" g="0" b="0"/>
+      </a:effectRef>
+      <a:fontRef idx="minor">
+        <a:schemeClr val="lt1"/>
+      </a:fontRef>
+    </dgm:style>
+  </dgm:styleLbl>
+  <dgm:styleLbl name="parChTrans2D1">
+    <dgm:scene3d>
+      <a:camera prst="orthographicFront"/>
+      <a:lightRig rig="threePt" dir="t"/>
+    </dgm:scene3d>
+    <dgm:sp3d/>
+    <dgm:txPr/>
+    <dgm:style>
+      <a:lnRef idx="2">
+        <a:scrgbClr r="0" g="0" b="0"/>
+      </a:lnRef>
+      <a:fillRef idx="1">
+        <a:scrgbClr r="0" g="0" b="0"/>
+      </a:fillRef>
+      <a:effectRef idx="0">
+        <a:scrgbClr r="0" g="0" b="0"/>
+      </a:effectRef>
+      <a:fontRef idx="minor">
+        <a:schemeClr val="lt1"/>
+      </a:fontRef>
+    </dgm:style>
+  </dgm:styleLbl>
+  <dgm:styleLbl name="parChTrans2D2">
+    <dgm:scene3d>
+      <a:camera prst="orthographicFront"/>
+      <a:lightRig rig="threePt" dir="t"/>
+    </dgm:scene3d>
+    <dgm:sp3d/>
+    <dgm:txPr/>
+    <dgm:style>
+      <a:lnRef idx="2">
+        <a:scrgbClr r="0" g="0" b="0"/>
+      </a:lnRef>
+      <a:fillRef idx="1">
+        <a:scrgbClr r="0" g="0" b="0"/>
+      </a:fillRef>
+      <a:effectRef idx="0">
+        <a:scrgbClr r="0" g="0" b="0"/>
+      </a:effectRef>
+      <a:fontRef idx="minor">
+        <a:schemeClr val="lt1"/>
+      </a:fontRef>
+    </dgm:style>
+  </dgm:styleLbl>
+  <dgm:styleLbl name="parChTrans2D3">
+    <dgm:scene3d>
+      <a:camera prst="orthographicFront"/>
+      <a:lightRig rig="threePt" dir="t"/>
+    </dgm:scene3d>
+    <dgm:sp3d/>
+    <dgm:txPr/>
+    <dgm:style>
+      <a:lnRef idx="2">
+        <a:scrgbClr r="0" g="0" b="0"/>
+      </a:lnRef>
+      <a:fillRef idx="1">
+        <a:scrgbClr r="0" g="0" b="0"/>
+      </a:fillRef>
+      <a:effectRef idx="0">
+        <a:scrgbClr r="0" g="0" b="0"/>
+      </a:effectRef>
+      <a:fontRef idx="minor">
+        <a:schemeClr val="lt1"/>
+      </a:fontRef>
+    </dgm:style>
+  </dgm:styleLbl>
+  <dgm:styleLbl name="parChTrans2D4">
+    <dgm:scene3d>
+      <a:camera prst="orthographicFront"/>
+      <a:lightRig rig="threePt" dir="t"/>
+    </dgm:scene3d>
+    <dgm:sp3d/>
+    <dgm:txPr/>
+    <dgm:style>
+      <a:lnRef idx="2">
+        <a:scrgbClr r="0" g="0" b="0"/>
+      </a:lnRef>
+      <a:fillRef idx="1">
+        <a:scrgbClr r="0" g="0" b="0"/>
+      </a:fillRef>
+      <a:effectRef idx="0">
+        <a:scrgbClr r="0" g="0" b="0"/>
+      </a:effectRef>
+      <a:fontRef idx="minor">
+        <a:schemeClr val="lt1"/>
+      </a:fontRef>
+    </dgm:style>
+  </dgm:styleLbl>
+  <dgm:styleLbl name="parChTrans1D1">
+    <dgm:scene3d>
+      <a:camera prst="orthographicFront"/>
+      <a:lightRig rig="threePt" dir="t"/>
+    </dgm:scene3d>
+    <dgm:sp3d/>
+    <dgm:txPr/>
+    <dgm:style>
+      <a:lnRef idx="2">
+        <a:scrgbClr r="0" g="0" b="0"/>
+      </a:lnRef>
+      <a:fillRef idx="0">
+        <a:scrgbClr r="0" g="0" b="0"/>
+      </a:fillRef>
+      <a:effectRef idx="0">
+        <a:scrgbClr r="0" g="0" b="0"/>
+      </a:effectRef>
+      <a:fontRef idx="minor"/>
+    </dgm:style>
+  </dgm:styleLbl>
+  <dgm:styleLbl name="parChTrans1D2">
+    <dgm:scene3d>
+      <a:camera prst="orthographicFront"/>
+      <a:lightRig rig="threePt" dir="t"/>
+    </dgm:scene3d>
+    <dgm:sp3d/>
+    <dgm:txPr/>
+    <dgm:style>
+      <a:lnRef idx="2">
+        <a:scrgbClr r="0" g="0" b="0"/>
+      </a:lnRef>
+      <a:fillRef idx="0">
+        <a:scrgbClr r="0" g="0" b="0"/>
+      </a:fillRef>
+      <a:effectRef idx="0">
+        <a:scrgbClr r="0" g="0" b="0"/>
+      </a:effectRef>
+      <a:fontRef idx="minor"/>
+    </dgm:style>
+  </dgm:styleLbl>
+  <dgm:styleLbl name="parChTrans1D3">
+    <dgm:scene3d>
+      <a:camera prst="orthographicFront"/>
+      <a:lightRig rig="threePt" dir="t"/>
+    </dgm:scene3d>
+    <dgm:sp3d/>
+    <dgm:txPr/>
+    <dgm:style>
+      <a:lnRef idx="2">
+        <a:scrgbClr r="0" g="0" b="0"/>
+      </a:lnRef>
+      <a:fillRef idx="0">
+        <a:scrgbClr r="0" g="0" b="0"/>
+      </a:fillRef>
+      <a:effectRef idx="0">
+        <a:scrgbClr r="0" g="0" b="0"/>
+      </a:effectRef>
+      <a:fontRef idx="minor"/>
+    </dgm:style>
+  </dgm:styleLbl>
+  <dgm:styleLbl name="parChTrans1D4">
+    <dgm:scene3d>
+      <a:camera prst="orthographicFront"/>
+      <a:lightRig rig="threePt" dir="t"/>
+    </dgm:scene3d>
+    <dgm:sp3d/>
+    <dgm:txPr/>
+    <dgm:style>
+      <a:lnRef idx="2">
+        <a:scrgbClr r="0" g="0" b="0"/>
+      </a:lnRef>
+      <a:fillRef idx="0">
+        <a:scrgbClr r="0" g="0" b="0"/>
+      </a:fillRef>
+      <a:effectRef idx="0">
+        <a:scrgbClr r="0" g="0" b="0"/>
+      </a:effectRef>
+      <a:fontRef idx="minor"/>
+    </dgm:style>
+  </dgm:styleLbl>
+  <dgm:styleLbl name="fgAcc1">
+    <dgm:scene3d>
+      <a:camera prst="orthographicFront"/>
+      <a:lightRig rig="threePt" dir="t"/>
+    </dgm:scene3d>
+    <dgm:sp3d/>
+    <dgm:txPr/>
+    <dgm:style>
+      <a:lnRef idx="2">
+        <a:scrgbClr r="0" g="0" b="0"/>
+      </a:lnRef>
+      <a:fillRef idx="1">
+        <a:scrgbClr r="0" g="0" b="0"/>
+      </a:fillRef>
+      <a:effectRef idx="0">
+        <a:scrgbClr r="0" g="0" b="0"/>
+      </a:effectRef>
+      <a:fontRef idx="minor"/>
+    </dgm:style>
+  </dgm:styleLbl>
+  <dgm:styleLbl name="conFgAcc1">
+    <dgm:scene3d>
+      <a:camera prst="orthographicFront"/>
+      <a:lightRig rig="threePt" dir="t"/>
+    </dgm:scene3d>
+    <dgm:sp3d/>
+    <dgm:txPr/>
+    <dgm:style>
+      <a:lnRef idx="2">
+        <a:scrgbClr r="0" g="0" b="0"/>
+      </a:lnRef>
+      <a:fillRef idx="1">
+        <a:scrgbClr r="0" g="0" b="0"/>
+      </a:fillRef>
+      <a:effectRef idx="0">
+        <a:scrgbClr r="0" g="0" b="0"/>
+      </a:effectRef>
+      <a:fontRef idx="minor"/>
+    </dgm:style>
+  </dgm:styleLbl>
+  <dgm:styleLbl name="alignAcc1">
+    <dgm:scene3d>
+      <a:camera prst="orthographicFront"/>
+      <a:lightRig rig="threePt" dir="t"/>
+    </dgm:scene3d>
+    <dgm:sp3d/>
+    <dgm:txPr/>
+    <dgm:style>
+      <a:lnRef idx="2">
+        <a:scrgbClr r="0" g="0" b="0"/>
+      </a:lnRef>
+      <a:fillRef idx="1">
+        <a:scrgbClr r="0" g="0" b="0"/>
+      </a:fillRef>
+      <a:effectRef idx="0">
+        <a:scrgbClr r="0" g="0" b="0"/>
+      </a:effectRef>
+      <a:fontRef idx="minor"/>
+    </dgm:style>
+  </dgm:styleLbl>
+  <dgm:styleLbl name="trAlignAcc1">
+    <dgm:scene3d>
+      <a:camera prst="orthographicFront"/>
+      <a:lightRig rig="threePt" dir="t"/>
+    </dgm:scene3d>
+    <dgm:sp3d/>
+    <dgm:txPr/>
+    <dgm:style>
+      <a:lnRef idx="1">
+        <a:scrgbClr r="0" g="0" b="0"/>
+      </a:lnRef>
+      <a:fillRef idx="1">
+        <a:scrgbClr r="0" g="0" b="0"/>
+      </a:fillRef>
+      <a:effectRef idx="0">
+        <a:scrgbClr r="0" g="0" b="0"/>
+      </a:effectRef>
+      <a:fontRef idx="minor"/>
+    </dgm:style>
+  </dgm:styleLbl>
+  <dgm:styleLbl name="bgAcc1">
+    <dgm:scene3d>
+      <a:camera prst="orthographicFront"/>
+      <a:lightRig rig="threePt" dir="t"/>
+    </dgm:scene3d>
+    <dgm:sp3d/>
+    <dgm:txPr/>
+    <dgm:style>
+      <a:lnRef idx="2">
+        <a:scrgbClr r="0" g="0" b="0"/>
+      </a:lnRef>
+      <a:fillRef idx="1">
+        <a:scrgbClr r="0" g="0" b="0"/>
+      </a:fillRef>
+      <a:effectRef idx="0">
+        <a:scrgbClr r="0" g="0" b="0"/>
+      </a:effectRef>
+      <a:fontRef idx="minor"/>
+    </dgm:style>
+  </dgm:styleLbl>
+  <dgm:styleLbl name="solidFgAcc1">
+    <dgm:scene3d>
+      <a:camera prst="orthographicFront"/>
+      <a:lightRig rig="threePt" dir="t"/>
+    </dgm:scene3d>
+    <dgm:sp3d/>
+    <dgm:txPr/>
+    <dgm:style>
+      <a:lnRef idx="2">
+        <a:scrgbClr r="0" g="0" b="0"/>
+      </a:lnRef>
+      <a:fillRef idx="1">
+        <a:scrgbClr r="0" g="0" b="0"/>
+      </a:fillRef>
+      <a:effectRef idx="0">
+        <a:scrgbClr r="0" g="0" b="0"/>
+      </a:effectRef>
+      <a:fontRef idx="minor"/>
+    </dgm:style>
+  </dgm:styleLbl>
+  <dgm:styleLbl name="solidAlignAcc1">
+    <dgm:scene3d>
+      <a:camera prst="orthographicFront"/>
+      <a:lightRig rig="threePt" dir="t"/>
+    </dgm:scene3d>
+    <dgm:sp3d/>
+    <dgm:txPr/>
+    <dgm:style>
+      <a:lnRef idx="2">
+        <a:scrgbClr r="0" g="0" b="0"/>
+      </a:lnRef>
+      <a:fillRef idx="1">
+        <a:scrgbClr r="0" g="0" b="0"/>
+      </a:fillRef>
+      <a:effectRef idx="0">
+        <a:scrgbClr r="0" g="0" b="0"/>
+      </a:effectRef>
+      <a:fontRef idx="minor"/>
+    </dgm:style>
+  </dgm:styleLbl>
+  <dgm:styleLbl name="solidBgAcc1">
+    <dgm:scene3d>
+      <a:camera prst="orthographicFront"/>
+      <a:lightRig rig="threePt" dir="t"/>
+    </dgm:scene3d>
+    <dgm:sp3d/>
+    <dgm:txPr/>
+    <dgm:style>
+      <a:lnRef idx="2">
+        <a:scrgbClr r="0" g="0" b="0"/>
+      </a:lnRef>
+      <a:fillRef idx="1">
+        <a:scrgbClr r="0" g="0" b="0"/>
+      </a:fillRef>
+      <a:effectRef idx="0">
+        <a:scrgbClr r="0" g="0" b="0"/>
+      </a:effectRef>
+      <a:fontRef idx="minor"/>
+    </dgm:style>
+  </dgm:styleLbl>
+  <dgm:styleLbl name="fgAccFollowNode1">
+    <dgm:scene3d>
+      <a:camera prst="orthographicFront"/>
+      <a:lightRig rig="threePt" dir="t"/>
+    </dgm:scene3d>
+    <dgm:sp3d/>
+    <dgm:txPr/>
+    <dgm:style>
+      <a:lnRef idx="2">
+        <a:scrgbClr r="0" g="0" b="0"/>
+      </a:lnRef>
+      <a:fillRef idx="1">
+        <a:scrgbClr r="0" g="0" b="0"/>
+      </a:fillRef>
+      <a:effectRef idx="0">
+        <a:scrgbClr r="0" g="0" b="0"/>
+      </a:effectRef>
+      <a:fontRef idx="minor"/>
+    </dgm:style>
+  </dgm:styleLbl>
+  <dgm:styleLbl name="alignAccFollowNode1">
+    <dgm:scene3d>
+      <a:camera prst="orthographicFront"/>
+      <a:lightRig rig="threePt" dir="t"/>
+    </dgm:scene3d>
+    <dgm:sp3d/>
+    <dgm:txPr/>
+    <dgm:style>
+      <a:lnRef idx="2">
+        <a:scrgbClr r="0" g="0" b="0"/>
+      </a:lnRef>
+      <a:fillRef idx="1">
+        <a:scrgbClr r="0" g="0" b="0"/>
+      </a:fillRef>
+      <a:effectRef idx="0">
+        <a:scrgbClr r="0" g="0" b="0"/>
+      </a:effectRef>
+      <a:fontRef idx="minor"/>
+    </dgm:style>
+  </dgm:styleLbl>
+  <dgm:styleLbl name="bgAccFollowNode1">
+    <dgm:scene3d>
+      <a:camera prst="orthographicFront"/>
+      <a:lightRig rig="threePt" dir="t"/>
+    </dgm:scene3d>
+    <dgm:sp3d/>
+    <dgm:txPr/>
+    <dgm:style>
+      <a:lnRef idx="2">
+        <a:scrgbClr r="0" g="0" b="0"/>
+      </a:lnRef>
+      <a:fillRef idx="1">
+        <a:scrgbClr r="0" g="0" b="0"/>
+      </a:fillRef>
+      <a:effectRef idx="0">
+        <a:scrgbClr r="0" g="0" b="0"/>
+      </a:effectRef>
+      <a:fontRef idx="minor"/>
+    </dgm:style>
+  </dgm:styleLbl>
+  <dgm:styleLbl name="fgAcc0">
+    <dgm:scene3d>
+      <a:camera prst="orthographicFront"/>
+      <a:lightRig rig="threePt" dir="t"/>
+    </dgm:scene3d>
+    <dgm:sp3d/>
+    <dgm:txPr/>
+    <dgm:style>
+      <a:lnRef idx="2">
+        <a:scrgbClr r="0" g="0" b="0"/>
+      </a:lnRef>
+      <a:fillRef idx="1">
+        <a:scrgbClr r="0" g="0" b="0"/>
+      </a:fillRef>
+      <a:effectRef idx="0">
+        <a:scrgbClr r="0" g="0" b="0"/>
+      </a:effectRef>
+      <a:fontRef idx="minor"/>
+    </dgm:style>
+  </dgm:styleLbl>
+  <dgm:styleLbl name="fgAcc2">
+    <dgm:scene3d>
+      <a:camera prst="orthographicFront"/>
+      <a:lightRig rig="threePt" dir="t"/>
+    </dgm:scene3d>
+    <dgm:sp3d/>
+    <dgm:txPr/>
+    <dgm:style>
+      <a:lnRef idx="2">
+        <a:scrgbClr r="0" g="0" b="0"/>
+      </a:lnRef>
+      <a:fillRef idx="1">
+        <a:scrgbClr r="0" g="0" b="0"/>
+      </a:fillRef>
+      <a:effectRef idx="0">
+        <a:scrgbClr r="0" g="0" b="0"/>
+      </a:effectRef>
+      <a:fontRef idx="minor"/>
+    </dgm:style>
+  </dgm:styleLbl>
+  <dgm:styleLbl name="fgAcc3">
+    <dgm:scene3d>
+      <a:camera prst="orthographicFront"/>
+      <a:lightRig rig="threePt" dir="t"/>
+    </dgm:scene3d>
+    <dgm:sp3d/>
+    <dgm:txPr/>
+    <dgm:style>
+      <a:lnRef idx="2">
+        <a:scrgbClr r="0" g="0" b="0"/>
+      </a:lnRef>
+      <a:fillRef idx="1">
+        <a:scrgbClr r="0" g="0" b="0"/>
+      </a:fillRef>
+      <a:effectRef idx="0">
+        <a:scrgbClr r="0" g="0" b="0"/>
+      </a:effectRef>
+      <a:fontRef idx="minor"/>
+    </dgm:style>
+  </dgm:styleLbl>
+  <dgm:styleLbl name="fgAcc4">
+    <dgm:scene3d>
+      <a:camera prst="orthographicFront"/>
+      <a:lightRig rig="threePt" dir="t"/>
+    </dgm:scene3d>
+    <dgm:sp3d/>
+    <dgm:txPr/>
+    <dgm:style>
+      <a:lnRef idx="2">
+        <a:scrgbClr r="0" g="0" b="0"/>
+      </a:lnRef>
+      <a:fillRef idx="1">
+        <a:scrgbClr r="0" g="0" b="0"/>
+      </a:fillRef>
+      <a:effectRef idx="0">
+        <a:scrgbClr r="0" g="0" b="0"/>
+      </a:effectRef>
+      <a:fontRef idx="minor"/>
+    </dgm:style>
+  </dgm:styleLbl>
+  <dgm:styleLbl name="bgShp">
+    <dgm:scene3d>
+      <a:camera prst="orthographicFront"/>
+      <a:lightRig rig="threePt" dir="t"/>
+    </dgm:scene3d>
+    <dgm:sp3d/>
+    <dgm:txPr/>
+    <dgm:style>
+      <a:lnRef idx="0">
+        <a:scrgbClr r="0" g="0" b="0"/>
+      </a:lnRef>
+      <a:fillRef idx="1">
+        <a:scrgbClr r="0" g="0" b="0"/>
+      </a:fillRef>
+      <a:effectRef idx="0">
+        <a:scrgbClr r="0" g="0" b="0"/>
+      </a:effectRef>
+      <a:fontRef idx="minor"/>
+    </dgm:style>
+  </dgm:styleLbl>
+  <dgm:styleLbl name="dkBgShp">
+    <dgm:scene3d>
+      <a:camera prst="orthographicFront"/>
+      <a:lightRig rig="threePt" dir="t"/>
+    </dgm:scene3d>
+    <dgm:sp3d/>
+    <dgm:txPr/>
+    <dgm:style>
+      <a:lnRef idx="0">
+        <a:scrgbClr r="0" g="0" b="0"/>
+      </a:lnRef>
+      <a:fillRef idx="1">
+        <a:scrgbClr r="0" g="0" b="0"/>
+      </a:fillRef>
+      <a:effectRef idx="0">
+        <a:scrgbClr r="0" g="0" b="0"/>
+      </a:effectRef>
+      <a:fontRef idx="minor"/>
+    </dgm:style>
+  </dgm:styleLbl>
+  <dgm:styleLbl name="trBgShp">
+    <dgm:scene3d>
+      <a:camera prst="orthographicFront"/>
+      <a:lightRig rig="threePt" dir="t"/>
+    </dgm:scene3d>
+    <dgm:sp3d/>
+    <dgm:txPr/>
+    <dgm:style>
+      <a:lnRef idx="0">
+        <a:scrgbClr r="0" g="0" b="0"/>
+      </a:lnRef>
+      <a:fillRef idx="1">
+        <a:scrgbClr r="0" g="0" b="0"/>
+      </a:fillRef>
+      <a:effectRef idx="0">
+        <a:scrgbClr r="0" g="0" b="0"/>
+      </a:effectRef>
+      <a:fontRef idx="minor"/>
+    </dgm:style>
+  </dgm:styleLbl>
+  <dgm:styleLbl name="fgShp">
+    <dgm:scene3d>
+      <a:camera prst="orthographicFront"/>
+      <a:lightRig rig="threePt" dir="t"/>
+    </dgm:scene3d>
+    <dgm:sp3d/>
+    <dgm:txPr/>
+    <dgm:style>
+      <a:lnRef idx="2">
+        <a:scrgbClr r="0" g="0" b="0"/>
+      </a:lnRef>
+      <a:fillRef idx="1">
+        <a:scrgbClr r="0" g="0" b="0"/>
+      </a:fillRef>
+      <a:effectRef idx="0">
+        <a:scrgbClr r="0" g="0" b="0"/>
+      </a:effectRef>
+      <a:fontRef idx="minor"/>
+    </dgm:style>
+  </dgm:styleLbl>
+  <dgm:styleLbl name="revTx">
+    <dgm:scene3d>
+      <a:camera prst="orthographicFront"/>
+      <a:lightRig rig="threePt" dir="t"/>
+    </dgm:scene3d>
+    <dgm:sp3d/>
+    <dgm:txPr/>
+    <dgm:style>
+      <a:lnRef idx="0">
+        <a:scrgbClr r="0" g="0" b="0"/>
+      </a:lnRef>
+      <a:fillRef idx="0">
+        <a:scrgbClr r="0" g="0" b="0"/>
+      </a:fillRef>
+      <a:effectRef idx="0">
+        <a:scrgbClr r="0" g="0" b="0"/>
+      </a:effectRef>
+      <a:fontRef idx="minor"/>
+    </dgm:style>
+  </dgm:styleLbl>
+</dgm:styleDef>
+</file>
+
+<file path=ppt/diagrams/quickStyle2.xml><?xml version="1.0" encoding="utf-8"?>
 <dgm:styleDef xmlns:dgm="http://schemas.openxmlformats.org/drawingml/2006/diagram" xmlns:a="http://schemas.openxmlformats.org/drawingml/2006/main" uniqueId="urn:microsoft.com/office/officeart/2005/8/quickstyle/simple1">
   <dgm:title val=""/>
   <dgm:desc val=""/>
@@ -6264,6 +8932,109 @@
 <file path=ppt/slides/slide3.xml><?xml version="1.0" encoding="utf-8"?>
 <p:sld xmlns:a="http://schemas.openxmlformats.org/drawingml/2006/main" xmlns:r="http://schemas.openxmlformats.org/officeDocument/2006/relationships" xmlns:p="http://schemas.openxmlformats.org/presentationml/2006/main">
   <p:cSld>
+    <p:spTree>
+      <p:nvGrpSpPr>
+        <p:cNvPr id="1" name="">
+          <a:extLst>
+            <a:ext uri="{FF2B5EF4-FFF2-40B4-BE49-F238E27FC236}">
+              <a16:creationId xmlns:a16="http://schemas.microsoft.com/office/drawing/2014/main" id="{4CCFEC9F-1268-40DF-E721-F8CF5905267D}"/>
+            </a:ext>
+          </a:extLst>
+        </p:cNvPr>
+        <p:cNvGrpSpPr/>
+        <p:nvPr/>
+      </p:nvGrpSpPr>
+      <p:grpSpPr>
+        <a:xfrm>
+          <a:off x="0" y="0"/>
+          <a:ext cx="0" cy="0"/>
+          <a:chOff x="0" y="0"/>
+          <a:chExt cx="0" cy="0"/>
+        </a:xfrm>
+      </p:grpSpPr>
+      <p:sp>
+        <p:nvSpPr>
+          <p:cNvPr id="2" name="Titel 1">
+            <a:extLst>
+              <a:ext uri="{FF2B5EF4-FFF2-40B4-BE49-F238E27FC236}">
+                <a16:creationId xmlns:a16="http://schemas.microsoft.com/office/drawing/2014/main" id="{E3782008-E185-3950-9AD8-527ECF38CEA1}"/>
+              </a:ext>
+            </a:extLst>
+          </p:cNvPr>
+          <p:cNvSpPr>
+            <a:spLocks noGrp="1"/>
+          </p:cNvSpPr>
+          <p:nvPr>
+            <p:ph type="title"/>
+          </p:nvPr>
+        </p:nvSpPr>
+        <p:spPr/>
+        <p:txBody>
+          <a:bodyPr/>
+          <a:lstStyle/>
+          <a:p>
+            <a:r>
+              <a:rPr lang="de-DE" dirty="0"/>
+              <a:t>Grafik: User-Data- </a:t>
+            </a:r>
+            <a:r>
+              <a:rPr lang="de-DE" dirty="0" err="1"/>
+              <a:t>Algo</a:t>
+            </a:r>
+            <a:r>
+              <a:rPr lang="de-DE" dirty="0"/>
+              <a:t> Loop</a:t>
+            </a:r>
+          </a:p>
+        </p:txBody>
+      </p:sp>
+      <p:graphicFrame>
+        <p:nvGraphicFramePr>
+          <p:cNvPr id="5" name="Inhaltsplatzhalter 4">
+            <a:extLst>
+              <a:ext uri="{FF2B5EF4-FFF2-40B4-BE49-F238E27FC236}">
+                <a16:creationId xmlns:a16="http://schemas.microsoft.com/office/drawing/2014/main" id="{F48BB022-CD19-C9A6-3FA8-F6BE50129D3B}"/>
+              </a:ext>
+            </a:extLst>
+          </p:cNvPr>
+          <p:cNvGraphicFramePr>
+            <a:graphicFrameLocks noGrp="1"/>
+          </p:cNvGraphicFramePr>
+          <p:nvPr>
+            <p:ph idx="1"/>
+            <p:extLst>
+              <p:ext uri="{D42A27DB-BD31-4B8C-83A1-F6EECF244321}">
+                <p14:modId xmlns:p14="http://schemas.microsoft.com/office/powerpoint/2010/main" val="1437804055"/>
+              </p:ext>
+            </p:extLst>
+          </p:nvPr>
+        </p:nvGraphicFramePr>
+        <p:xfrm>
+          <a:off x="838200" y="1825625"/>
+          <a:ext cx="10515600" cy="4351338"/>
+        </p:xfrm>
+        <a:graphic>
+          <a:graphicData uri="http://schemas.openxmlformats.org/drawingml/2006/diagram">
+            <dgm:relIds xmlns:dgm="http://schemas.openxmlformats.org/drawingml/2006/diagram" xmlns:r="http://schemas.openxmlformats.org/officeDocument/2006/relationships" r:dm="rId2" r:lo="rId3" r:qs="rId4" r:cs="rId5"/>
+          </a:graphicData>
+        </a:graphic>
+      </p:graphicFrame>
+    </p:spTree>
+    <p:extLst>
+      <p:ext uri="{BB962C8B-B14F-4D97-AF65-F5344CB8AC3E}">
+        <p14:creationId xmlns:p14="http://schemas.microsoft.com/office/powerpoint/2010/main" val="1495931812"/>
+      </p:ext>
+    </p:extLst>
+  </p:cSld>
+  <p:clrMapOvr>
+    <a:masterClrMapping/>
+  </p:clrMapOvr>
+</p:sld>
+</file>
+
+<file path=ppt/slides/slide4.xml><?xml version="1.0" encoding="utf-8"?>
+<p:sld xmlns:a="http://schemas.openxmlformats.org/drawingml/2006/main" xmlns:r="http://schemas.openxmlformats.org/officeDocument/2006/relationships" xmlns:p="http://schemas.openxmlformats.org/presentationml/2006/main">
+  <p:cSld>
     <p:bg>
       <p:bgPr>
         <a:solidFill>

</xml_diff>

<commit_message>
improved flow of the text; problem with citations still to solve
</commit_message>
<xml_diff>
--- a/figures/custom_figues.pptx
+++ b/figures/custom_figues.pptx
@@ -8,7 +8,8 @@
     <p:sldId id="256" r:id="rId2"/>
     <p:sldId id="257" r:id="rId3"/>
     <p:sldId id="259" r:id="rId4"/>
-    <p:sldId id="258" r:id="rId5"/>
+    <p:sldId id="260" r:id="rId5"/>
+    <p:sldId id="258" r:id="rId6"/>
   </p:sldIdLst>
   <p:sldSz cx="12192000" cy="6858000"/>
   <p:notesSz cx="6858000" cy="9144000"/>
@@ -1870,16 +1871,23 @@
     <dgm:pt modelId="{C38B08AF-CE08-5849-A8A6-98DC2239060B}">
       <dgm:prSet phldrT="[Text]"/>
       <dgm:spPr>
-        <a:solidFill>
-          <a:srgbClr val="1A944D"/>
-        </a:solidFill>
+        <a:noFill/>
+        <a:ln>
+          <a:solidFill>
+            <a:schemeClr val="tx1"/>
+          </a:solidFill>
+        </a:ln>
       </dgm:spPr>
       <dgm:t>
         <a:bodyPr/>
         <a:lstStyle/>
         <a:p>
           <a:r>
-            <a:rPr lang="de-DE" dirty="0"/>
+            <a:rPr lang="de-DE" dirty="0">
+              <a:solidFill>
+                <a:schemeClr val="tx1"/>
+              </a:solidFill>
+            </a:rPr>
             <a:t>User Interaction</a:t>
           </a:r>
         </a:p>
@@ -1900,9 +1908,11 @@
       <dgm:prSet/>
       <dgm:spPr>
         <a:solidFill>
-          <a:srgbClr val="1A944D">
+          <a:schemeClr val="tx1">
+            <a:lumMod val="65000"/>
+            <a:lumOff val="35000"/>
             <a:alpha val="40000"/>
-          </a:srgbClr>
+          </a:schemeClr>
         </a:solidFill>
       </dgm:spPr>
       <dgm:t>
@@ -1916,16 +1926,23 @@
     <dgm:pt modelId="{6FB608DA-2749-B949-8310-7E4660DB923D}">
       <dgm:prSet phldrT="[Text]"/>
       <dgm:spPr>
-        <a:solidFill>
-          <a:srgbClr val="1A944D"/>
-        </a:solidFill>
+        <a:noFill/>
+        <a:ln>
+          <a:solidFill>
+            <a:schemeClr val="tx1"/>
+          </a:solidFill>
+        </a:ln>
       </dgm:spPr>
       <dgm:t>
         <a:bodyPr/>
         <a:lstStyle/>
         <a:p>
           <a:r>
-            <a:rPr lang="de-DE" dirty="0"/>
+            <a:rPr lang="de-DE" dirty="0">
+              <a:solidFill>
+                <a:schemeClr val="tx1"/>
+              </a:solidFill>
+            </a:rPr>
             <a:t>Data</a:t>
           </a:r>
         </a:p>
@@ -1946,9 +1963,11 @@
       <dgm:prSet/>
       <dgm:spPr>
         <a:solidFill>
-          <a:srgbClr val="1A944D">
+          <a:schemeClr val="tx1">
+            <a:lumMod val="50000"/>
+            <a:lumOff val="50000"/>
             <a:alpha val="40000"/>
-          </a:srgbClr>
+          </a:schemeClr>
         </a:solidFill>
       </dgm:spPr>
       <dgm:t>
@@ -1962,19 +1981,30 @@
     <dgm:pt modelId="{E9882685-8D6F-6346-A295-CA83B0BAAE38}">
       <dgm:prSet phldrT="[Text]"/>
       <dgm:spPr>
-        <a:solidFill>
-          <a:srgbClr val="1A944D"/>
-        </a:solidFill>
+        <a:noFill/>
+        <a:ln>
+          <a:solidFill>
+            <a:schemeClr val="tx1"/>
+          </a:solidFill>
+        </a:ln>
       </dgm:spPr>
       <dgm:t>
         <a:bodyPr/>
         <a:lstStyle/>
         <a:p>
           <a:r>
-            <a:rPr lang="de-DE" dirty="0" err="1"/>
+            <a:rPr lang="de-DE" dirty="0" err="1">
+              <a:solidFill>
+                <a:schemeClr val="tx1"/>
+              </a:solidFill>
+            </a:rPr>
             <a:t>Algorithm</a:t>
           </a:r>
-          <a:endParaRPr lang="de-DE" dirty="0"/>
+          <a:endParaRPr lang="de-DE" dirty="0">
+            <a:solidFill>
+              <a:schemeClr val="tx1"/>
+            </a:solidFill>
+          </a:endParaRPr>
         </a:p>
       </dgm:t>
     </dgm:pt>
@@ -1993,9 +2023,11 @@
       <dgm:prSet/>
       <dgm:spPr>
         <a:solidFill>
-          <a:srgbClr val="1A944D">
+          <a:schemeClr val="tx1">
+            <a:lumMod val="50000"/>
+            <a:lumOff val="50000"/>
             <a:alpha val="40000"/>
-          </a:srgbClr>
+          </a:schemeClr>
         </a:solidFill>
       </dgm:spPr>
       <dgm:t>
@@ -2548,17 +2580,10 @@
         <a:prstGeom prst="ellipse">
           <a:avLst/>
         </a:prstGeom>
-        <a:solidFill>
-          <a:srgbClr val="1A944D"/>
-        </a:solidFill>
+        <a:noFill/>
         <a:ln w="19050" cap="flat" cmpd="sng" algn="ctr">
           <a:solidFill>
-            <a:schemeClr val="lt1">
-              <a:hueOff val="0"/>
-              <a:satOff val="0"/>
-              <a:lumOff val="0"/>
-              <a:alphaOff val="0"/>
-            </a:schemeClr>
+            <a:schemeClr val="tx1"/>
           </a:solidFill>
           <a:prstDash val="solid"/>
           <a:miter lim="800000"/>
@@ -2598,7 +2623,11 @@
             <a:buNone/>
           </a:pPr>
           <a:r>
-            <a:rPr lang="de-DE" sz="2100" kern="1200" dirty="0"/>
+            <a:rPr lang="de-DE" sz="2100" kern="1200" dirty="0">
+              <a:solidFill>
+                <a:schemeClr val="tx1"/>
+              </a:solidFill>
+            </a:rPr>
             <a:t>User Interaction</a:t>
           </a:r>
         </a:p>
@@ -2625,9 +2654,11 @@
           </a:avLst>
         </a:prstGeom>
         <a:solidFill>
-          <a:srgbClr val="1A944D">
+          <a:schemeClr val="tx1">
+            <a:lumMod val="65000"/>
+            <a:lumOff val="35000"/>
             <a:alpha val="40000"/>
-          </a:srgbClr>
+          </a:schemeClr>
         </a:solidFill>
         <a:ln>
           <a:noFill/>
@@ -2687,17 +2718,10 @@
         <a:prstGeom prst="ellipse">
           <a:avLst/>
         </a:prstGeom>
-        <a:solidFill>
-          <a:srgbClr val="1A944D"/>
-        </a:solidFill>
+        <a:noFill/>
         <a:ln w="19050" cap="flat" cmpd="sng" algn="ctr">
           <a:solidFill>
-            <a:schemeClr val="lt1">
-              <a:hueOff val="0"/>
-              <a:satOff val="0"/>
-              <a:lumOff val="0"/>
-              <a:alphaOff val="0"/>
-            </a:schemeClr>
+            <a:schemeClr val="tx1"/>
           </a:solidFill>
           <a:prstDash val="solid"/>
           <a:miter lim="800000"/>
@@ -2737,7 +2761,11 @@
             <a:buNone/>
           </a:pPr>
           <a:r>
-            <a:rPr lang="de-DE" sz="2100" kern="1200" dirty="0"/>
+            <a:rPr lang="de-DE" sz="2100" kern="1200" dirty="0">
+              <a:solidFill>
+                <a:schemeClr val="tx1"/>
+              </a:solidFill>
+            </a:rPr>
             <a:t>Data</a:t>
           </a:r>
         </a:p>
@@ -2764,9 +2792,11 @@
           </a:avLst>
         </a:prstGeom>
         <a:solidFill>
-          <a:srgbClr val="1A944D">
+          <a:schemeClr val="tx1">
+            <a:lumMod val="50000"/>
+            <a:lumOff val="50000"/>
             <a:alpha val="40000"/>
-          </a:srgbClr>
+          </a:schemeClr>
         </a:solidFill>
         <a:ln>
           <a:noFill/>
@@ -2826,17 +2856,10 @@
         <a:prstGeom prst="ellipse">
           <a:avLst/>
         </a:prstGeom>
-        <a:solidFill>
-          <a:srgbClr val="1A944D"/>
-        </a:solidFill>
+        <a:noFill/>
         <a:ln w="19050" cap="flat" cmpd="sng" algn="ctr">
           <a:solidFill>
-            <a:schemeClr val="lt1">
-              <a:hueOff val="0"/>
-              <a:satOff val="0"/>
-              <a:lumOff val="0"/>
-              <a:alphaOff val="0"/>
-            </a:schemeClr>
+            <a:schemeClr val="tx1"/>
           </a:solidFill>
           <a:prstDash val="solid"/>
           <a:miter lim="800000"/>
@@ -2876,10 +2899,18 @@
             <a:buNone/>
           </a:pPr>
           <a:r>
-            <a:rPr lang="de-DE" sz="2100" kern="1200" dirty="0" err="1"/>
+            <a:rPr lang="de-DE" sz="2100" kern="1200" dirty="0" err="1">
+              <a:solidFill>
+                <a:schemeClr val="tx1"/>
+              </a:solidFill>
+            </a:rPr>
             <a:t>Algorithm</a:t>
           </a:r>
-          <a:endParaRPr lang="de-DE" sz="2100" kern="1200" dirty="0"/>
+          <a:endParaRPr lang="de-DE" sz="2100" kern="1200" dirty="0">
+            <a:solidFill>
+              <a:schemeClr val="tx1"/>
+            </a:solidFill>
+          </a:endParaRPr>
         </a:p>
       </dsp:txBody>
       <dsp:txXfrm>
@@ -2904,9 +2935,11 @@
           </a:avLst>
         </a:prstGeom>
         <a:solidFill>
-          <a:srgbClr val="1A944D">
+          <a:schemeClr val="tx1">
+            <a:lumMod val="50000"/>
+            <a:lumOff val="50000"/>
             <a:alpha val="40000"/>
-          </a:srgbClr>
+          </a:schemeClr>
         </a:solidFill>
         <a:ln>
           <a:noFill/>
@@ -5594,7 +5627,7 @@
           <a:p>
             <a:fld id="{D5F60856-2EF1-5F4B-9954-DAACB240462E}" type="datetimeFigureOut">
               <a:rPr lang="de-DE" smtClean="0"/>
-              <a:t>11.01.25</a:t>
+              <a:t>27.02.25</a:t>
             </a:fld>
             <a:endParaRPr lang="de-DE"/>
           </a:p>
@@ -5792,7 +5825,7 @@
           <a:p>
             <a:fld id="{D5F60856-2EF1-5F4B-9954-DAACB240462E}" type="datetimeFigureOut">
               <a:rPr lang="de-DE" smtClean="0"/>
-              <a:t>11.01.25</a:t>
+              <a:t>27.02.25</a:t>
             </a:fld>
             <a:endParaRPr lang="de-DE"/>
           </a:p>
@@ -6000,7 +6033,7 @@
           <a:p>
             <a:fld id="{D5F60856-2EF1-5F4B-9954-DAACB240462E}" type="datetimeFigureOut">
               <a:rPr lang="de-DE" smtClean="0"/>
-              <a:t>11.01.25</a:t>
+              <a:t>27.02.25</a:t>
             </a:fld>
             <a:endParaRPr lang="de-DE"/>
           </a:p>
@@ -6198,7 +6231,7 @@
           <a:p>
             <a:fld id="{D5F60856-2EF1-5F4B-9954-DAACB240462E}" type="datetimeFigureOut">
               <a:rPr lang="de-DE" smtClean="0"/>
-              <a:t>11.01.25</a:t>
+              <a:t>27.02.25</a:t>
             </a:fld>
             <a:endParaRPr lang="de-DE"/>
           </a:p>
@@ -6473,7 +6506,7 @@
           <a:p>
             <a:fld id="{D5F60856-2EF1-5F4B-9954-DAACB240462E}" type="datetimeFigureOut">
               <a:rPr lang="de-DE" smtClean="0"/>
-              <a:t>11.01.25</a:t>
+              <a:t>27.02.25</a:t>
             </a:fld>
             <a:endParaRPr lang="de-DE"/>
           </a:p>
@@ -6738,7 +6771,7 @@
           <a:p>
             <a:fld id="{D5F60856-2EF1-5F4B-9954-DAACB240462E}" type="datetimeFigureOut">
               <a:rPr lang="de-DE" smtClean="0"/>
-              <a:t>11.01.25</a:t>
+              <a:t>27.02.25</a:t>
             </a:fld>
             <a:endParaRPr lang="de-DE"/>
           </a:p>
@@ -7150,7 +7183,7 @@
           <a:p>
             <a:fld id="{D5F60856-2EF1-5F4B-9954-DAACB240462E}" type="datetimeFigureOut">
               <a:rPr lang="de-DE" smtClean="0"/>
-              <a:t>11.01.25</a:t>
+              <a:t>27.02.25</a:t>
             </a:fld>
             <a:endParaRPr lang="de-DE"/>
           </a:p>
@@ -7291,7 +7324,7 @@
           <a:p>
             <a:fld id="{D5F60856-2EF1-5F4B-9954-DAACB240462E}" type="datetimeFigureOut">
               <a:rPr lang="de-DE" smtClean="0"/>
-              <a:t>11.01.25</a:t>
+              <a:t>27.02.25</a:t>
             </a:fld>
             <a:endParaRPr lang="de-DE"/>
           </a:p>
@@ -7404,7 +7437,7 @@
           <a:p>
             <a:fld id="{D5F60856-2EF1-5F4B-9954-DAACB240462E}" type="datetimeFigureOut">
               <a:rPr lang="de-DE" smtClean="0"/>
-              <a:t>11.01.25</a:t>
+              <a:t>27.02.25</a:t>
             </a:fld>
             <a:endParaRPr lang="de-DE"/>
           </a:p>
@@ -7715,7 +7748,7 @@
           <a:p>
             <a:fld id="{D5F60856-2EF1-5F4B-9954-DAACB240462E}" type="datetimeFigureOut">
               <a:rPr lang="de-DE" smtClean="0"/>
-              <a:t>11.01.25</a:t>
+              <a:t>27.02.25</a:t>
             </a:fld>
             <a:endParaRPr lang="de-DE"/>
           </a:p>
@@ -8003,7 +8036,7 @@
           <a:p>
             <a:fld id="{D5F60856-2EF1-5F4B-9954-DAACB240462E}" type="datetimeFigureOut">
               <a:rPr lang="de-DE" smtClean="0"/>
-              <a:t>11.01.25</a:t>
+              <a:t>27.02.25</a:t>
             </a:fld>
             <a:endParaRPr lang="de-DE"/>
           </a:p>
@@ -8244,7 +8277,7 @@
           <a:p>
             <a:fld id="{D5F60856-2EF1-5F4B-9954-DAACB240462E}" type="datetimeFigureOut">
               <a:rPr lang="de-DE" smtClean="0"/>
-              <a:t>11.01.25</a:t>
+              <a:t>27.02.25</a:t>
             </a:fld>
             <a:endParaRPr lang="de-DE"/>
           </a:p>
@@ -9004,7 +9037,7 @@
             <p:ph idx="1"/>
             <p:extLst>
               <p:ext uri="{D42A27DB-BD31-4B8C-83A1-F6EECF244321}">
-                <p14:modId xmlns:p14="http://schemas.microsoft.com/office/powerpoint/2010/main" val="1437804055"/>
+                <p14:modId xmlns:p14="http://schemas.microsoft.com/office/powerpoint/2010/main" val="3086387828"/>
               </p:ext>
             </p:extLst>
           </p:nvPr>
@@ -9033,6 +9066,549 @@
 </file>
 
 <file path=ppt/slides/slide4.xml><?xml version="1.0" encoding="utf-8"?>
+<p:sld xmlns:a="http://schemas.openxmlformats.org/drawingml/2006/main" xmlns:r="http://schemas.openxmlformats.org/officeDocument/2006/relationships" xmlns:p="http://schemas.openxmlformats.org/presentationml/2006/main">
+  <p:cSld>
+    <p:spTree>
+      <p:nvGrpSpPr>
+        <p:cNvPr id="1" name=""/>
+        <p:cNvGrpSpPr/>
+        <p:nvPr/>
+      </p:nvGrpSpPr>
+      <p:grpSpPr>
+        <a:xfrm>
+          <a:off x="0" y="0"/>
+          <a:ext cx="0" cy="0"/>
+          <a:chOff x="0" y="0"/>
+          <a:chExt cx="0" cy="0"/>
+        </a:xfrm>
+      </p:grpSpPr>
+      <p:sp>
+        <p:nvSpPr>
+          <p:cNvPr id="2" name="Titel 1">
+            <a:extLst>
+              <a:ext uri="{FF2B5EF4-FFF2-40B4-BE49-F238E27FC236}">
+                <a16:creationId xmlns:a16="http://schemas.microsoft.com/office/drawing/2014/main" id="{667D506F-1C95-766D-BCAD-0EC51D96555C}"/>
+              </a:ext>
+            </a:extLst>
+          </p:cNvPr>
+          <p:cNvSpPr>
+            <a:spLocks noGrp="1"/>
+          </p:cNvSpPr>
+          <p:nvPr>
+            <p:ph type="title"/>
+          </p:nvPr>
+        </p:nvSpPr>
+        <p:spPr/>
+        <p:txBody>
+          <a:bodyPr/>
+          <a:lstStyle/>
+          <a:p>
+            <a:endParaRPr lang="de-DE"/>
+          </a:p>
+        </p:txBody>
+      </p:sp>
+      <p:sp>
+        <p:nvSpPr>
+          <p:cNvPr id="5" name="Textfeld 4">
+            <a:extLst>
+              <a:ext uri="{FF2B5EF4-FFF2-40B4-BE49-F238E27FC236}">
+                <a16:creationId xmlns:a16="http://schemas.microsoft.com/office/drawing/2014/main" id="{C79E842E-905F-EFE1-BE35-A15C15A000CC}"/>
+              </a:ext>
+            </a:extLst>
+          </p:cNvPr>
+          <p:cNvSpPr txBox="1"/>
+          <p:nvPr/>
+        </p:nvSpPr>
+        <p:spPr>
+          <a:xfrm>
+            <a:off x="1427685" y="3369972"/>
+            <a:ext cx="898072" cy="375558"/>
+          </a:xfrm>
+          <a:prstGeom prst="rect">
+            <a:avLst/>
+          </a:prstGeom>
+          <a:noFill/>
+          <a:ln>
+            <a:solidFill>
+              <a:schemeClr val="accent1">
+                <a:shade val="15000"/>
+              </a:schemeClr>
+            </a:solidFill>
+          </a:ln>
+        </p:spPr>
+        <p:txBody>
+          <a:bodyPr wrap="square" rtlCol="0">
+            <a:spAutoFit/>
+          </a:bodyPr>
+          <a:lstStyle/>
+          <a:p>
+            <a:r>
+              <a:rPr lang="de-DE"/>
+              <a:t>   X,  A</a:t>
+            </a:r>
+          </a:p>
+        </p:txBody>
+      </p:sp>
+      <p:sp>
+        <p:nvSpPr>
+          <p:cNvPr id="10" name="Textfeld 9">
+            <a:extLst>
+              <a:ext uri="{FF2B5EF4-FFF2-40B4-BE49-F238E27FC236}">
+                <a16:creationId xmlns:a16="http://schemas.microsoft.com/office/drawing/2014/main" id="{5C704E87-9EF4-FE24-DB14-4ED05B4C17FF}"/>
+              </a:ext>
+            </a:extLst>
+          </p:cNvPr>
+          <p:cNvSpPr txBox="1"/>
+          <p:nvPr/>
+        </p:nvSpPr>
+        <p:spPr>
+          <a:xfrm>
+            <a:off x="5837225" y="2297300"/>
+            <a:ext cx="898072" cy="375558"/>
+          </a:xfrm>
+          <a:prstGeom prst="rect">
+            <a:avLst/>
+          </a:prstGeom>
+          <a:noFill/>
+          <a:ln>
+            <a:solidFill>
+              <a:schemeClr val="accent1">
+                <a:shade val="15000"/>
+              </a:schemeClr>
+            </a:solidFill>
+          </a:ln>
+        </p:spPr>
+        <p:txBody>
+          <a:bodyPr wrap="square" rtlCol="0">
+            <a:spAutoFit/>
+          </a:bodyPr>
+          <a:lstStyle/>
+          <a:p>
+            <a:r>
+              <a:rPr lang="de-DE"/>
+              <a:t>   Y = 1</a:t>
+            </a:r>
+          </a:p>
+        </p:txBody>
+      </p:sp>
+      <p:sp>
+        <p:nvSpPr>
+          <p:cNvPr id="11" name="Textfeld 10">
+            <a:extLst>
+              <a:ext uri="{FF2B5EF4-FFF2-40B4-BE49-F238E27FC236}">
+                <a16:creationId xmlns:a16="http://schemas.microsoft.com/office/drawing/2014/main" id="{2B581FAA-B256-49A0-AA23-C088BC25EBC5}"/>
+              </a:ext>
+            </a:extLst>
+          </p:cNvPr>
+          <p:cNvSpPr txBox="1"/>
+          <p:nvPr/>
+        </p:nvSpPr>
+        <p:spPr>
+          <a:xfrm>
+            <a:off x="5837225" y="3091691"/>
+            <a:ext cx="898072" cy="375558"/>
+          </a:xfrm>
+          <a:prstGeom prst="rect">
+            <a:avLst/>
+          </a:prstGeom>
+          <a:noFill/>
+          <a:ln>
+            <a:solidFill>
+              <a:schemeClr val="accent1">
+                <a:shade val="15000"/>
+              </a:schemeClr>
+            </a:solidFill>
+          </a:ln>
+        </p:spPr>
+        <p:txBody>
+          <a:bodyPr wrap="square" rtlCol="0">
+            <a:spAutoFit/>
+          </a:bodyPr>
+          <a:lstStyle/>
+          <a:p>
+            <a:r>
+              <a:rPr lang="de-DE"/>
+              <a:t>   Y = 0</a:t>
+            </a:r>
+          </a:p>
+        </p:txBody>
+      </p:sp>
+      <p:sp>
+        <p:nvSpPr>
+          <p:cNvPr id="12" name="Textfeld 11">
+            <a:extLst>
+              <a:ext uri="{FF2B5EF4-FFF2-40B4-BE49-F238E27FC236}">
+                <a16:creationId xmlns:a16="http://schemas.microsoft.com/office/drawing/2014/main" id="{5403CE4C-60EB-6346-E5C5-42592F6E8D1F}"/>
+              </a:ext>
+            </a:extLst>
+          </p:cNvPr>
+          <p:cNvSpPr txBox="1"/>
+          <p:nvPr/>
+        </p:nvSpPr>
+        <p:spPr>
+          <a:xfrm>
+            <a:off x="4536500" y="4019416"/>
+            <a:ext cx="898072" cy="375558"/>
+          </a:xfrm>
+          <a:prstGeom prst="rect">
+            <a:avLst/>
+          </a:prstGeom>
+          <a:noFill/>
+          <a:ln>
+            <a:solidFill>
+              <a:schemeClr val="accent1">
+                <a:shade val="15000"/>
+              </a:schemeClr>
+            </a:solidFill>
+          </a:ln>
+        </p:spPr>
+        <p:txBody>
+          <a:bodyPr wrap="square" rtlCol="0">
+            <a:spAutoFit/>
+          </a:bodyPr>
+          <a:lstStyle/>
+          <a:p>
+            <a:r>
+              <a:rPr lang="de-DE"/>
+              <a:t>   Z= 0</a:t>
+            </a:r>
+          </a:p>
+        </p:txBody>
+      </p:sp>
+      <p:sp>
+        <p:nvSpPr>
+          <p:cNvPr id="13" name="Textfeld 12">
+            <a:extLst>
+              <a:ext uri="{FF2B5EF4-FFF2-40B4-BE49-F238E27FC236}">
+                <a16:creationId xmlns:a16="http://schemas.microsoft.com/office/drawing/2014/main" id="{4EE52DF3-D5B7-7259-507B-EAABCDAB9E17}"/>
+              </a:ext>
+            </a:extLst>
+          </p:cNvPr>
+          <p:cNvSpPr txBox="1"/>
+          <p:nvPr/>
+        </p:nvSpPr>
+        <p:spPr>
+          <a:xfrm>
+            <a:off x="4536500" y="2718020"/>
+            <a:ext cx="898072" cy="375558"/>
+          </a:xfrm>
+          <a:prstGeom prst="rect">
+            <a:avLst/>
+          </a:prstGeom>
+          <a:noFill/>
+          <a:ln>
+            <a:solidFill>
+              <a:schemeClr val="accent1">
+                <a:shade val="15000"/>
+              </a:schemeClr>
+            </a:solidFill>
+          </a:ln>
+        </p:spPr>
+        <p:txBody>
+          <a:bodyPr wrap="square" rtlCol="0">
+            <a:spAutoFit/>
+          </a:bodyPr>
+          <a:lstStyle/>
+          <a:p>
+            <a:r>
+              <a:rPr lang="de-DE"/>
+              <a:t>   Z = 1</a:t>
+            </a:r>
+          </a:p>
+        </p:txBody>
+      </p:sp>
+      <p:sp>
+        <p:nvSpPr>
+          <p:cNvPr id="14" name="Textfeld 13">
+            <a:extLst>
+              <a:ext uri="{FF2B5EF4-FFF2-40B4-BE49-F238E27FC236}">
+                <a16:creationId xmlns:a16="http://schemas.microsoft.com/office/drawing/2014/main" id="{EFBADAB6-10E0-FF62-84C4-83596E695C44}"/>
+              </a:ext>
+            </a:extLst>
+          </p:cNvPr>
+          <p:cNvSpPr txBox="1"/>
+          <p:nvPr/>
+        </p:nvSpPr>
+        <p:spPr>
+          <a:xfrm>
+            <a:off x="2848253" y="3096086"/>
+            <a:ext cx="1191985" cy="923330"/>
+          </a:xfrm>
+          <a:prstGeom prst="rect">
+            <a:avLst/>
+          </a:prstGeom>
+          <a:noFill/>
+          <a:ln>
+            <a:solidFill>
+              <a:schemeClr val="accent1">
+                <a:shade val="15000"/>
+              </a:schemeClr>
+            </a:solidFill>
+          </a:ln>
+        </p:spPr>
+        <p:txBody>
+          <a:bodyPr wrap="square" rtlCol="0">
+            <a:spAutoFit/>
+          </a:bodyPr>
+          <a:lstStyle/>
+          <a:p>
+            <a:r>
+              <a:rPr lang="de-DE"/>
+              <a:t>Biased</a:t>
+            </a:r>
+          </a:p>
+          <a:p>
+            <a:r>
+              <a:rPr lang="de-DE"/>
+              <a:t>Decision</a:t>
+            </a:r>
+          </a:p>
+          <a:p>
+            <a:r>
+              <a:rPr lang="de-DE"/>
+              <a:t>Policy</a:t>
+            </a:r>
+          </a:p>
+        </p:txBody>
+      </p:sp>
+      <p:cxnSp>
+        <p:nvCxnSpPr>
+          <p:cNvPr id="16" name="Gerade Verbindung mit Pfeil 15">
+            <a:extLst>
+              <a:ext uri="{FF2B5EF4-FFF2-40B4-BE49-F238E27FC236}">
+                <a16:creationId xmlns:a16="http://schemas.microsoft.com/office/drawing/2014/main" id="{180A9B77-9BD9-13A5-BEC9-61AA5179B912}"/>
+              </a:ext>
+            </a:extLst>
+          </p:cNvPr>
+          <p:cNvCxnSpPr>
+            <a:endCxn id="14" idx="1"/>
+          </p:cNvCxnSpPr>
+          <p:nvPr/>
+        </p:nvCxnSpPr>
+        <p:spPr>
+          <a:xfrm>
+            <a:off x="2325757" y="3557751"/>
+            <a:ext cx="522496" cy="0"/>
+          </a:xfrm>
+          <a:prstGeom prst="straightConnector1">
+            <a:avLst/>
+          </a:prstGeom>
+          <a:ln>
+            <a:solidFill>
+              <a:schemeClr val="tx1"/>
+            </a:solidFill>
+            <a:tailEnd type="triangle"/>
+          </a:ln>
+        </p:spPr>
+        <p:style>
+          <a:lnRef idx="2">
+            <a:schemeClr val="accent1"/>
+          </a:lnRef>
+          <a:fillRef idx="0">
+            <a:schemeClr val="accent1"/>
+          </a:fillRef>
+          <a:effectRef idx="1">
+            <a:schemeClr val="accent1"/>
+          </a:effectRef>
+          <a:fontRef idx="minor">
+            <a:schemeClr val="tx1"/>
+          </a:fontRef>
+        </p:style>
+      </p:cxnSp>
+      <p:cxnSp>
+        <p:nvCxnSpPr>
+          <p:cNvPr id="18" name="Gerade Verbindung mit Pfeil 17">
+            <a:extLst>
+              <a:ext uri="{FF2B5EF4-FFF2-40B4-BE49-F238E27FC236}">
+                <a16:creationId xmlns:a16="http://schemas.microsoft.com/office/drawing/2014/main" id="{FCF8E496-4CDE-59D1-F340-A03595238B06}"/>
+              </a:ext>
+            </a:extLst>
+          </p:cNvPr>
+          <p:cNvCxnSpPr>
+            <a:stCxn id="14" idx="3"/>
+            <a:endCxn id="13" idx="1"/>
+          </p:cNvCxnSpPr>
+          <p:nvPr/>
+        </p:nvCxnSpPr>
+        <p:spPr>
+          <a:xfrm flipV="1">
+            <a:off x="4040238" y="2905799"/>
+            <a:ext cx="496262" cy="651952"/>
+          </a:xfrm>
+          <a:prstGeom prst="straightConnector1">
+            <a:avLst/>
+          </a:prstGeom>
+          <a:ln>
+            <a:solidFill>
+              <a:schemeClr val="tx1"/>
+            </a:solidFill>
+            <a:tailEnd type="triangle"/>
+          </a:ln>
+        </p:spPr>
+        <p:style>
+          <a:lnRef idx="2">
+            <a:schemeClr val="accent1"/>
+          </a:lnRef>
+          <a:fillRef idx="0">
+            <a:schemeClr val="accent1"/>
+          </a:fillRef>
+          <a:effectRef idx="1">
+            <a:schemeClr val="accent1"/>
+          </a:effectRef>
+          <a:fontRef idx="minor">
+            <a:schemeClr val="tx1"/>
+          </a:fontRef>
+        </p:style>
+      </p:cxnSp>
+      <p:cxnSp>
+        <p:nvCxnSpPr>
+          <p:cNvPr id="20" name="Gerade Verbindung mit Pfeil 19">
+            <a:extLst>
+              <a:ext uri="{FF2B5EF4-FFF2-40B4-BE49-F238E27FC236}">
+                <a16:creationId xmlns:a16="http://schemas.microsoft.com/office/drawing/2014/main" id="{02EF02E8-7E5E-4C42-94D0-CB16233058DD}"/>
+              </a:ext>
+            </a:extLst>
+          </p:cNvPr>
+          <p:cNvCxnSpPr>
+            <a:stCxn id="14" idx="3"/>
+            <a:endCxn id="12" idx="1"/>
+          </p:cNvCxnSpPr>
+          <p:nvPr/>
+        </p:nvCxnSpPr>
+        <p:spPr>
+          <a:xfrm>
+            <a:off x="4040238" y="3557751"/>
+            <a:ext cx="496262" cy="649444"/>
+          </a:xfrm>
+          <a:prstGeom prst="straightConnector1">
+            <a:avLst/>
+          </a:prstGeom>
+          <a:ln>
+            <a:solidFill>
+              <a:schemeClr val="tx1"/>
+            </a:solidFill>
+            <a:tailEnd type="triangle"/>
+          </a:ln>
+        </p:spPr>
+        <p:style>
+          <a:lnRef idx="2">
+            <a:schemeClr val="accent1"/>
+          </a:lnRef>
+          <a:fillRef idx="0">
+            <a:schemeClr val="accent1"/>
+          </a:fillRef>
+          <a:effectRef idx="1">
+            <a:schemeClr val="accent1"/>
+          </a:effectRef>
+          <a:fontRef idx="minor">
+            <a:schemeClr val="tx1"/>
+          </a:fontRef>
+        </p:style>
+      </p:cxnSp>
+      <p:cxnSp>
+        <p:nvCxnSpPr>
+          <p:cNvPr id="22" name="Gerade Verbindung mit Pfeil 21">
+            <a:extLst>
+              <a:ext uri="{FF2B5EF4-FFF2-40B4-BE49-F238E27FC236}">
+                <a16:creationId xmlns:a16="http://schemas.microsoft.com/office/drawing/2014/main" id="{EB387DD5-209F-8A27-5454-1293430F3E85}"/>
+              </a:ext>
+            </a:extLst>
+          </p:cNvPr>
+          <p:cNvCxnSpPr>
+            <a:stCxn id="13" idx="3"/>
+            <a:endCxn id="10" idx="1"/>
+          </p:cNvCxnSpPr>
+          <p:nvPr/>
+        </p:nvCxnSpPr>
+        <p:spPr>
+          <a:xfrm flipV="1">
+            <a:off x="5434572" y="2485079"/>
+            <a:ext cx="402653" cy="420720"/>
+          </a:xfrm>
+          <a:prstGeom prst="straightConnector1">
+            <a:avLst/>
+          </a:prstGeom>
+          <a:ln>
+            <a:solidFill>
+              <a:schemeClr val="tx1"/>
+            </a:solidFill>
+            <a:tailEnd type="triangle"/>
+          </a:ln>
+        </p:spPr>
+        <p:style>
+          <a:lnRef idx="2">
+            <a:schemeClr val="accent1"/>
+          </a:lnRef>
+          <a:fillRef idx="0">
+            <a:schemeClr val="accent1"/>
+          </a:fillRef>
+          <a:effectRef idx="1">
+            <a:schemeClr val="accent1"/>
+          </a:effectRef>
+          <a:fontRef idx="minor">
+            <a:schemeClr val="tx1"/>
+          </a:fontRef>
+        </p:style>
+      </p:cxnSp>
+      <p:cxnSp>
+        <p:nvCxnSpPr>
+          <p:cNvPr id="24" name="Gerade Verbindung mit Pfeil 23">
+            <a:extLst>
+              <a:ext uri="{FF2B5EF4-FFF2-40B4-BE49-F238E27FC236}">
+                <a16:creationId xmlns:a16="http://schemas.microsoft.com/office/drawing/2014/main" id="{4F185578-9C8D-26BD-A7EE-1427DB3B0AF3}"/>
+              </a:ext>
+            </a:extLst>
+          </p:cNvPr>
+          <p:cNvCxnSpPr>
+            <a:stCxn id="13" idx="3"/>
+            <a:endCxn id="11" idx="1"/>
+          </p:cNvCxnSpPr>
+          <p:nvPr/>
+        </p:nvCxnSpPr>
+        <p:spPr>
+          <a:xfrm>
+            <a:off x="5434572" y="2905799"/>
+            <a:ext cx="402653" cy="373671"/>
+          </a:xfrm>
+          <a:prstGeom prst="straightConnector1">
+            <a:avLst/>
+          </a:prstGeom>
+          <a:ln>
+            <a:solidFill>
+              <a:schemeClr val="tx1"/>
+            </a:solidFill>
+            <a:tailEnd type="triangle"/>
+          </a:ln>
+        </p:spPr>
+        <p:style>
+          <a:lnRef idx="2">
+            <a:schemeClr val="accent1"/>
+          </a:lnRef>
+          <a:fillRef idx="0">
+            <a:schemeClr val="accent1"/>
+          </a:fillRef>
+          <a:effectRef idx="1">
+            <a:schemeClr val="accent1"/>
+          </a:effectRef>
+          <a:fontRef idx="minor">
+            <a:schemeClr val="tx1"/>
+          </a:fontRef>
+        </p:style>
+      </p:cxnSp>
+    </p:spTree>
+    <p:extLst>
+      <p:ext uri="{BB962C8B-B14F-4D97-AF65-F5344CB8AC3E}">
+        <p14:creationId xmlns:p14="http://schemas.microsoft.com/office/powerpoint/2010/main" val="380324711"/>
+      </p:ext>
+    </p:extLst>
+  </p:cSld>
+  <p:clrMapOvr>
+    <a:masterClrMapping/>
+  </p:clrMapOvr>
+</p:sld>
+</file>
+
+<file path=ppt/slides/slide5.xml><?xml version="1.0" encoding="utf-8"?>
 <p:sld xmlns:a="http://schemas.openxmlformats.org/drawingml/2006/main" xmlns:r="http://schemas.openxmlformats.org/officeDocument/2006/relationships" xmlns:p="http://schemas.openxmlformats.org/presentationml/2006/main">
   <p:cSld>
     <p:bg>

</xml_diff>

<commit_message>
resolved citaiton issues with manual additional manual bib file
</commit_message>
<xml_diff>
--- a/figures/custom_figues.pptx
+++ b/figures/custom_figues.pptx
@@ -9037,7 +9037,7 @@
             <p:ph idx="1"/>
             <p:extLst>
               <p:ext uri="{D42A27DB-BD31-4B8C-83A1-F6EECF244321}">
-                <p14:modId xmlns:p14="http://schemas.microsoft.com/office/powerpoint/2010/main" val="3086387828"/>
+                <p14:modId xmlns:p14="http://schemas.microsoft.com/office/powerpoint/2010/main" val="3032299041"/>
               </p:ext>
             </p:extLst>
           </p:nvPr>
@@ -9052,6 +9052,111 @@
           </a:graphicData>
         </a:graphic>
       </p:graphicFrame>
+      <p:sp>
+        <p:nvSpPr>
+          <p:cNvPr id="3" name="Textfeld 2">
+            <a:extLst>
+              <a:ext uri="{FF2B5EF4-FFF2-40B4-BE49-F238E27FC236}">
+                <a16:creationId xmlns:a16="http://schemas.microsoft.com/office/drawing/2014/main" id="{C89799E4-CDED-5E9A-C488-1BDEA02C9B88}"/>
+              </a:ext>
+            </a:extLst>
+          </p:cNvPr>
+          <p:cNvSpPr txBox="1"/>
+          <p:nvPr/>
+        </p:nvSpPr>
+        <p:spPr>
+          <a:xfrm>
+            <a:off x="6916615" y="1954579"/>
+            <a:ext cx="2028093" cy="369332"/>
+          </a:xfrm>
+          <a:prstGeom prst="rect">
+            <a:avLst/>
+          </a:prstGeom>
+          <a:noFill/>
+        </p:spPr>
+        <p:txBody>
+          <a:bodyPr wrap="square" rtlCol="0">
+            <a:spAutoFit/>
+          </a:bodyPr>
+          <a:lstStyle/>
+          <a:p>
+            <a:r>
+              <a:rPr lang="de-DE"/>
+              <a:t>e.g. historical bias</a:t>
+            </a:r>
+          </a:p>
+        </p:txBody>
+      </p:sp>
+      <p:sp>
+        <p:nvSpPr>
+          <p:cNvPr id="4" name="Textfeld 3">
+            <a:extLst>
+              <a:ext uri="{FF2B5EF4-FFF2-40B4-BE49-F238E27FC236}">
+                <a16:creationId xmlns:a16="http://schemas.microsoft.com/office/drawing/2014/main" id="{2FD88BF1-0D91-DA7C-D58A-7B8E71DF5AE3}"/>
+              </a:ext>
+            </a:extLst>
+          </p:cNvPr>
+          <p:cNvSpPr txBox="1"/>
+          <p:nvPr/>
+        </p:nvSpPr>
+        <p:spPr>
+          <a:xfrm>
+            <a:off x="7930661" y="4001294"/>
+            <a:ext cx="2309446" cy="369332"/>
+          </a:xfrm>
+          <a:prstGeom prst="rect">
+            <a:avLst/>
+          </a:prstGeom>
+          <a:noFill/>
+        </p:spPr>
+        <p:txBody>
+          <a:bodyPr wrap="square" rtlCol="0">
+            <a:spAutoFit/>
+          </a:bodyPr>
+          <a:lstStyle/>
+          <a:p>
+            <a:r>
+              <a:rPr lang="de-DE"/>
+              <a:t>e.g. aggregation bias</a:t>
+            </a:r>
+          </a:p>
+        </p:txBody>
+      </p:sp>
+      <p:sp>
+        <p:nvSpPr>
+          <p:cNvPr id="6" name="Textfeld 5">
+            <a:extLst>
+              <a:ext uri="{FF2B5EF4-FFF2-40B4-BE49-F238E27FC236}">
+                <a16:creationId xmlns:a16="http://schemas.microsoft.com/office/drawing/2014/main" id="{74B10484-E97C-DB01-F58F-0519ACB33AC2}"/>
+              </a:ext>
+            </a:extLst>
+          </p:cNvPr>
+          <p:cNvSpPr txBox="1"/>
+          <p:nvPr/>
+        </p:nvSpPr>
+        <p:spPr>
+          <a:xfrm>
+            <a:off x="2116017" y="4001294"/>
+            <a:ext cx="2145323" cy="369332"/>
+          </a:xfrm>
+          <a:prstGeom prst="rect">
+            <a:avLst/>
+          </a:prstGeom>
+          <a:noFill/>
+        </p:spPr>
+        <p:txBody>
+          <a:bodyPr wrap="square" rtlCol="0">
+            <a:spAutoFit/>
+          </a:bodyPr>
+          <a:lstStyle/>
+          <a:p>
+            <a:r>
+              <a:rPr lang="de-DE"/>
+              <a:t>e.g. evaluation bias</a:t>
+            </a:r>
+          </a:p>
+        </p:txBody>
+      </p:sp>
     </p:spTree>
     <p:extLst>
       <p:ext uri="{BB962C8B-B14F-4D97-AF65-F5344CB8AC3E}">

</xml_diff>